<commit_message>
Added two fixed slides
</commit_message>
<xml_diff>
--- a/templates/sil_combined_template.pptx
+++ b/templates/sil_combined_template.pptx
@@ -5,12 +5,8 @@
     <p:sldMasterId id="2147483648" r:id="rId1"/>
   </p:sldMasterIdLst>
   <p:notesMasterIdLst>
-    <p:notesMasterId r:id="rId4"/>
+    <p:notesMasterId r:id="rId2"/>
   </p:notesMasterIdLst>
-  <p:sldIdLst>
-    <p:sldId id="257" r:id="rId2"/>
-    <p:sldId id="258" r:id="rId3"/>
-  </p:sldIdLst>
   <p:sldSz cx="12192000" cy="6858000"/>
   <p:notesSz cx="6858000" cy="9144000"/>
   <p:defaultTextStyle>
@@ -198,7 +194,7 @@
           <a:p>
             <a:fld id="{28781AA5-545A-B34C-92F0-8E176A4C0101}" type="datetimeFigureOut">
               <a:rPr lang="en-US" smtClean="0"/>
-              <a:t>7/1/25</a:t>
+              <a:t>7/10/25</a:t>
             </a:fld>
             <a:endParaRPr lang="en-US"/>
           </a:p>
@@ -465,214 +461,6 @@
 </p:notesMaster>
 </file>
 
-<file path=ppt/notesSlides/notesSlide1.xml><?xml version="1.0" encoding="utf-8"?>
-<p:notes xmlns:a="http://schemas.openxmlformats.org/drawingml/2006/main" xmlns:r="http://schemas.openxmlformats.org/officeDocument/2006/relationships" xmlns:p="http://schemas.openxmlformats.org/presentationml/2006/main" showMasterSp="0" showMasterPhAnim="0">
-  <p:cSld>
-    <p:spTree>
-      <p:nvGrpSpPr>
-        <p:cNvPr id="1" name="Shape 158"/>
-        <p:cNvGrpSpPr/>
-        <p:nvPr/>
-      </p:nvGrpSpPr>
-      <p:grpSpPr>
-        <a:xfrm>
-          <a:off x="0" y="0"/>
-          <a:ext cx="0" cy="0"/>
-          <a:chOff x="0" y="0"/>
-          <a:chExt cx="0" cy="0"/>
-        </a:xfrm>
-      </p:grpSpPr>
-      <p:sp>
-        <p:nvSpPr>
-          <p:cNvPr id="159" name="Google Shape;159;g15793237a92_0_236:notes"/>
-          <p:cNvSpPr>
-            <a:spLocks noGrp="1" noRot="1" noChangeAspect="1"/>
-          </p:cNvSpPr>
-          <p:nvPr>
-            <p:ph type="sldImg" idx="2"/>
-          </p:nvPr>
-        </p:nvSpPr>
-        <p:spPr>
-          <a:xfrm>
-            <a:off x="381000" y="685800"/>
-            <a:ext cx="6096000" cy="3429000"/>
-          </a:xfrm>
-          <a:custGeom>
-            <a:avLst/>
-            <a:gdLst/>
-            <a:ahLst/>
-            <a:cxnLst/>
-            <a:rect l="l" t="t" r="r" b="b"/>
-            <a:pathLst>
-              <a:path w="120000" h="120000" extrusionOk="0">
-                <a:moveTo>
-                  <a:pt x="0" y="0"/>
-                </a:moveTo>
-                <a:lnTo>
-                  <a:pt x="120000" y="0"/>
-                </a:lnTo>
-                <a:lnTo>
-                  <a:pt x="120000" y="120000"/>
-                </a:lnTo>
-                <a:lnTo>
-                  <a:pt x="0" y="120000"/>
-                </a:lnTo>
-                <a:close/>
-              </a:path>
-            </a:pathLst>
-          </a:custGeom>
-        </p:spPr>
-      </p:sp>
-      <p:sp>
-        <p:nvSpPr>
-          <p:cNvPr id="160" name="Google Shape;160;g15793237a92_0_236:notes"/>
-          <p:cNvSpPr txBox="1">
-            <a:spLocks noGrp="1"/>
-          </p:cNvSpPr>
-          <p:nvPr>
-            <p:ph type="body" idx="1"/>
-          </p:nvPr>
-        </p:nvSpPr>
-        <p:spPr>
-          <a:xfrm>
-            <a:off x="685800" y="4343400"/>
-            <a:ext cx="5486400" cy="4114800"/>
-          </a:xfrm>
-          <a:prstGeom prst="rect">
-            <a:avLst/>
-          </a:prstGeom>
-        </p:spPr>
-        <p:txBody>
-          <a:bodyPr spcFirstLastPara="1" wrap="square" lIns="91425" tIns="91425" rIns="91425" bIns="91425" anchor="t" anchorCtr="0">
-            <a:noAutofit/>
-          </a:bodyPr>
-          <a:lstStyle/>
-          <a:p>
-            <a:pPr marL="0" lvl="0" indent="0" algn="l" rtl="0">
-              <a:spcBef>
-                <a:spcPts val="0"/>
-              </a:spcBef>
-              <a:spcAft>
-                <a:spcPts val="0"/>
-              </a:spcAft>
-              <a:buNone/>
-            </a:pPr>
-            <a:endParaRPr/>
-          </a:p>
-        </p:txBody>
-      </p:sp>
-    </p:spTree>
-  </p:cSld>
-  <p:clrMapOvr>
-    <a:masterClrMapping/>
-  </p:clrMapOvr>
-</p:notes>
-</file>
-
-<file path=ppt/notesSlides/notesSlide2.xml><?xml version="1.0" encoding="utf-8"?>
-<p:notes xmlns:a="http://schemas.openxmlformats.org/drawingml/2006/main" xmlns:r="http://schemas.openxmlformats.org/officeDocument/2006/relationships" xmlns:p="http://schemas.openxmlformats.org/presentationml/2006/main" showMasterSp="0" showMasterPhAnim="0">
-  <p:cSld>
-    <p:spTree>
-      <p:nvGrpSpPr>
-        <p:cNvPr id="1" name="Shape 165"/>
-        <p:cNvGrpSpPr/>
-        <p:nvPr/>
-      </p:nvGrpSpPr>
-      <p:grpSpPr>
-        <a:xfrm>
-          <a:off x="0" y="0"/>
-          <a:ext cx="0" cy="0"/>
-          <a:chOff x="0" y="0"/>
-          <a:chExt cx="0" cy="0"/>
-        </a:xfrm>
-      </p:grpSpPr>
-      <p:sp>
-        <p:nvSpPr>
-          <p:cNvPr id="166" name="Google Shape;166;g1308ba3f109_0_266:notes"/>
-          <p:cNvSpPr>
-            <a:spLocks noGrp="1" noRot="1" noChangeAspect="1"/>
-          </p:cNvSpPr>
-          <p:nvPr>
-            <p:ph type="sldImg" idx="2"/>
-          </p:nvPr>
-        </p:nvSpPr>
-        <p:spPr>
-          <a:xfrm>
-            <a:off x="381000" y="685800"/>
-            <a:ext cx="6096000" cy="3429000"/>
-          </a:xfrm>
-          <a:custGeom>
-            <a:avLst/>
-            <a:gdLst/>
-            <a:ahLst/>
-            <a:cxnLst/>
-            <a:rect l="l" t="t" r="r" b="b"/>
-            <a:pathLst>
-              <a:path w="120000" h="120000" extrusionOk="0">
-                <a:moveTo>
-                  <a:pt x="0" y="0"/>
-                </a:moveTo>
-                <a:lnTo>
-                  <a:pt x="120000" y="0"/>
-                </a:lnTo>
-                <a:lnTo>
-                  <a:pt x="120000" y="120000"/>
-                </a:lnTo>
-                <a:lnTo>
-                  <a:pt x="0" y="120000"/>
-                </a:lnTo>
-                <a:close/>
-              </a:path>
-            </a:pathLst>
-          </a:custGeom>
-        </p:spPr>
-      </p:sp>
-      <p:sp>
-        <p:nvSpPr>
-          <p:cNvPr id="167" name="Google Shape;167;g1308ba3f109_0_266:notes"/>
-          <p:cNvSpPr txBox="1">
-            <a:spLocks noGrp="1"/>
-          </p:cNvSpPr>
-          <p:nvPr>
-            <p:ph type="body" idx="1"/>
-          </p:nvPr>
-        </p:nvSpPr>
-        <p:spPr>
-          <a:xfrm>
-            <a:off x="685800" y="4343400"/>
-            <a:ext cx="5486400" cy="4114800"/>
-          </a:xfrm>
-          <a:prstGeom prst="rect">
-            <a:avLst/>
-          </a:prstGeom>
-        </p:spPr>
-        <p:txBody>
-          <a:bodyPr spcFirstLastPara="1" wrap="square" lIns="91425" tIns="91425" rIns="91425" bIns="91425" anchor="t" anchorCtr="0">
-            <a:noAutofit/>
-          </a:bodyPr>
-          <a:lstStyle/>
-          <a:p>
-            <a:pPr marL="0" lvl="0" indent="0" algn="l" rtl="0">
-              <a:spcBef>
-                <a:spcPts val="0"/>
-              </a:spcBef>
-              <a:spcAft>
-                <a:spcPts val="0"/>
-              </a:spcAft>
-              <a:buNone/>
-            </a:pPr>
-            <a:endParaRPr/>
-          </a:p>
-        </p:txBody>
-      </p:sp>
-    </p:spTree>
-  </p:cSld>
-  <p:clrMapOvr>
-    <a:masterClrMapping/>
-  </p:clrMapOvr>
-</p:notes>
-</file>
-
 <file path=ppt/slideLayouts/slideLayout1.xml><?xml version="1.0" encoding="utf-8"?>
 <p:sldLayout xmlns:a="http://schemas.openxmlformats.org/drawingml/2006/main" xmlns:r="http://schemas.openxmlformats.org/officeDocument/2006/relationships" xmlns:p="http://schemas.openxmlformats.org/presentationml/2006/main" type="title" preserve="1">
   <p:cSld name="Title Slide">
@@ -820,7 +608,7 @@
           <a:p>
             <a:fld id="{CCF15043-91C0-B948-9306-70C64EA31C4A}" type="datetimeFigureOut">
               <a:rPr lang="en-US" smtClean="0"/>
-              <a:t>7/1/25</a:t>
+              <a:t>7/10/25</a:t>
             </a:fld>
             <a:endParaRPr lang="en-US"/>
           </a:p>
@@ -894,6 +682,294 @@
 </file>
 
 <file path=ppt/slideLayouts/slideLayout10.xml><?xml version="1.0" encoding="utf-8"?>
+<p:sldLayout xmlns:a="http://schemas.openxmlformats.org/drawingml/2006/main" xmlns:r="http://schemas.openxmlformats.org/officeDocument/2006/relationships" xmlns:p="http://schemas.openxmlformats.org/presentationml/2006/main" type="picTx" preserve="1">
+  <p:cSld name="Picture with Caption">
+    <p:spTree>
+      <p:nvGrpSpPr>
+        <p:cNvPr id="1" name=""/>
+        <p:cNvGrpSpPr/>
+        <p:nvPr/>
+      </p:nvGrpSpPr>
+      <p:grpSpPr>
+        <a:xfrm>
+          <a:off x="0" y="0"/>
+          <a:ext cx="0" cy="0"/>
+          <a:chOff x="0" y="0"/>
+          <a:chExt cx="0" cy="0"/>
+        </a:xfrm>
+      </p:grpSpPr>
+      <p:sp>
+        <p:nvSpPr>
+          <p:cNvPr id="2" name="Title 1">
+            <a:extLst>
+              <a:ext uri="{FF2B5EF4-FFF2-40B4-BE49-F238E27FC236}">
+                <a16:creationId xmlns:a16="http://schemas.microsoft.com/office/drawing/2014/main" id="{62A98988-506A-C699-C5F6-15E939806A7A}"/>
+              </a:ext>
+            </a:extLst>
+          </p:cNvPr>
+          <p:cNvSpPr>
+            <a:spLocks noGrp="1"/>
+          </p:cNvSpPr>
+          <p:nvPr>
+            <p:ph type="title"/>
+          </p:nvPr>
+        </p:nvSpPr>
+        <p:spPr>
+          <a:xfrm>
+            <a:off x="839788" y="457200"/>
+            <a:ext cx="3932237" cy="1600200"/>
+          </a:xfrm>
+        </p:spPr>
+        <p:txBody>
+          <a:bodyPr anchor="b"/>
+          <a:lstStyle>
+            <a:lvl1pPr>
+              <a:defRPr sz="3200"/>
+            </a:lvl1pPr>
+          </a:lstStyle>
+          <a:p>
+            <a:r>
+              <a:rPr lang="en-US"/>
+              <a:t>Click to edit Master title style</a:t>
+            </a:r>
+          </a:p>
+        </p:txBody>
+      </p:sp>
+      <p:sp>
+        <p:nvSpPr>
+          <p:cNvPr id="3" name="Picture Placeholder 2">
+            <a:extLst>
+              <a:ext uri="{FF2B5EF4-FFF2-40B4-BE49-F238E27FC236}">
+                <a16:creationId xmlns:a16="http://schemas.microsoft.com/office/drawing/2014/main" id="{2059F0CC-95F6-365E-C92D-A1FBA931712B}"/>
+              </a:ext>
+            </a:extLst>
+          </p:cNvPr>
+          <p:cNvSpPr>
+            <a:spLocks noGrp="1"/>
+          </p:cNvSpPr>
+          <p:nvPr>
+            <p:ph type="pic" idx="1"/>
+          </p:nvPr>
+        </p:nvSpPr>
+        <p:spPr>
+          <a:xfrm>
+            <a:off x="5183188" y="987425"/>
+            <a:ext cx="6172200" cy="4873625"/>
+          </a:xfrm>
+        </p:spPr>
+        <p:txBody>
+          <a:bodyPr/>
+          <a:lstStyle>
+            <a:lvl1pPr marL="0" indent="0">
+              <a:buNone/>
+              <a:defRPr sz="3200"/>
+            </a:lvl1pPr>
+            <a:lvl2pPr marL="457200" indent="0">
+              <a:buNone/>
+              <a:defRPr sz="2800"/>
+            </a:lvl2pPr>
+            <a:lvl3pPr marL="914400" indent="0">
+              <a:buNone/>
+              <a:defRPr sz="2400"/>
+            </a:lvl3pPr>
+            <a:lvl4pPr marL="1371600" indent="0">
+              <a:buNone/>
+              <a:defRPr sz="2000"/>
+            </a:lvl4pPr>
+            <a:lvl5pPr marL="1828800" indent="0">
+              <a:buNone/>
+              <a:defRPr sz="2000"/>
+            </a:lvl5pPr>
+            <a:lvl6pPr marL="2286000" indent="0">
+              <a:buNone/>
+              <a:defRPr sz="2000"/>
+            </a:lvl6pPr>
+            <a:lvl7pPr marL="2743200" indent="0">
+              <a:buNone/>
+              <a:defRPr sz="2000"/>
+            </a:lvl7pPr>
+            <a:lvl8pPr marL="3200400" indent="0">
+              <a:buNone/>
+              <a:defRPr sz="2000"/>
+            </a:lvl8pPr>
+            <a:lvl9pPr marL="3657600" indent="0">
+              <a:buNone/>
+              <a:defRPr sz="2000"/>
+            </a:lvl9pPr>
+          </a:lstStyle>
+          <a:p>
+            <a:endParaRPr lang="en-US"/>
+          </a:p>
+        </p:txBody>
+      </p:sp>
+      <p:sp>
+        <p:nvSpPr>
+          <p:cNvPr id="4" name="Text Placeholder 3">
+            <a:extLst>
+              <a:ext uri="{FF2B5EF4-FFF2-40B4-BE49-F238E27FC236}">
+                <a16:creationId xmlns:a16="http://schemas.microsoft.com/office/drawing/2014/main" id="{0EA54852-7DCB-EF91-53B4-5B4ACF36C7CF}"/>
+              </a:ext>
+            </a:extLst>
+          </p:cNvPr>
+          <p:cNvSpPr>
+            <a:spLocks noGrp="1"/>
+          </p:cNvSpPr>
+          <p:nvPr>
+            <p:ph type="body" sz="half" idx="2"/>
+          </p:nvPr>
+        </p:nvSpPr>
+        <p:spPr>
+          <a:xfrm>
+            <a:off x="839788" y="2057400"/>
+            <a:ext cx="3932237" cy="3811588"/>
+          </a:xfrm>
+        </p:spPr>
+        <p:txBody>
+          <a:bodyPr/>
+          <a:lstStyle>
+            <a:lvl1pPr marL="0" indent="0">
+              <a:buNone/>
+              <a:defRPr sz="1600"/>
+            </a:lvl1pPr>
+            <a:lvl2pPr marL="457200" indent="0">
+              <a:buNone/>
+              <a:defRPr sz="1400"/>
+            </a:lvl2pPr>
+            <a:lvl3pPr marL="914400" indent="0">
+              <a:buNone/>
+              <a:defRPr sz="1200"/>
+            </a:lvl3pPr>
+            <a:lvl4pPr marL="1371600" indent="0">
+              <a:buNone/>
+              <a:defRPr sz="1000"/>
+            </a:lvl4pPr>
+            <a:lvl5pPr marL="1828800" indent="0">
+              <a:buNone/>
+              <a:defRPr sz="1000"/>
+            </a:lvl5pPr>
+            <a:lvl6pPr marL="2286000" indent="0">
+              <a:buNone/>
+              <a:defRPr sz="1000"/>
+            </a:lvl6pPr>
+            <a:lvl7pPr marL="2743200" indent="0">
+              <a:buNone/>
+              <a:defRPr sz="1000"/>
+            </a:lvl7pPr>
+            <a:lvl8pPr marL="3200400" indent="0">
+              <a:buNone/>
+              <a:defRPr sz="1000"/>
+            </a:lvl8pPr>
+            <a:lvl9pPr marL="3657600" indent="0">
+              <a:buNone/>
+              <a:defRPr sz="1000"/>
+            </a:lvl9pPr>
+          </a:lstStyle>
+          <a:p>
+            <a:pPr lvl="0"/>
+            <a:r>
+              <a:rPr lang="en-US"/>
+              <a:t>Click to edit Master text styles</a:t>
+            </a:r>
+          </a:p>
+        </p:txBody>
+      </p:sp>
+      <p:sp>
+        <p:nvSpPr>
+          <p:cNvPr id="5" name="Date Placeholder 4">
+            <a:extLst>
+              <a:ext uri="{FF2B5EF4-FFF2-40B4-BE49-F238E27FC236}">
+                <a16:creationId xmlns:a16="http://schemas.microsoft.com/office/drawing/2014/main" id="{8FABC63B-1A8E-89E0-78BF-991CB84D435F}"/>
+              </a:ext>
+            </a:extLst>
+          </p:cNvPr>
+          <p:cNvSpPr>
+            <a:spLocks noGrp="1"/>
+          </p:cNvSpPr>
+          <p:nvPr>
+            <p:ph type="dt" sz="half" idx="10"/>
+          </p:nvPr>
+        </p:nvSpPr>
+        <p:spPr/>
+        <p:txBody>
+          <a:bodyPr/>
+          <a:lstStyle/>
+          <a:p>
+            <a:fld id="{CCF15043-91C0-B948-9306-70C64EA31C4A}" type="datetimeFigureOut">
+              <a:rPr lang="en-US" smtClean="0"/>
+              <a:t>7/10/25</a:t>
+            </a:fld>
+            <a:endParaRPr lang="en-US"/>
+          </a:p>
+        </p:txBody>
+      </p:sp>
+      <p:sp>
+        <p:nvSpPr>
+          <p:cNvPr id="6" name="Footer Placeholder 5">
+            <a:extLst>
+              <a:ext uri="{FF2B5EF4-FFF2-40B4-BE49-F238E27FC236}">
+                <a16:creationId xmlns:a16="http://schemas.microsoft.com/office/drawing/2014/main" id="{759565FB-6D53-BEBF-128E-3309E51951CC}"/>
+              </a:ext>
+            </a:extLst>
+          </p:cNvPr>
+          <p:cNvSpPr>
+            <a:spLocks noGrp="1"/>
+          </p:cNvSpPr>
+          <p:nvPr>
+            <p:ph type="ftr" sz="quarter" idx="11"/>
+          </p:nvPr>
+        </p:nvSpPr>
+        <p:spPr/>
+        <p:txBody>
+          <a:bodyPr/>
+          <a:lstStyle/>
+          <a:p>
+            <a:endParaRPr lang="en-US"/>
+          </a:p>
+        </p:txBody>
+      </p:sp>
+      <p:sp>
+        <p:nvSpPr>
+          <p:cNvPr id="7" name="Slide Number Placeholder 6">
+            <a:extLst>
+              <a:ext uri="{FF2B5EF4-FFF2-40B4-BE49-F238E27FC236}">
+                <a16:creationId xmlns:a16="http://schemas.microsoft.com/office/drawing/2014/main" id="{625214A9-5A94-356E-4AF4-EEC86C9A563E}"/>
+              </a:ext>
+            </a:extLst>
+          </p:cNvPr>
+          <p:cNvSpPr>
+            <a:spLocks noGrp="1"/>
+          </p:cNvSpPr>
+          <p:nvPr>
+            <p:ph type="sldNum" sz="quarter" idx="12"/>
+          </p:nvPr>
+        </p:nvSpPr>
+        <p:spPr/>
+        <p:txBody>
+          <a:bodyPr/>
+          <a:lstStyle/>
+          <a:p>
+            <a:fld id="{946DE687-3AD7-5741-8041-7F1F69773D46}" type="slidenum">
+              <a:rPr lang="en-US" smtClean="0"/>
+              <a:t>‹#›</a:t>
+            </a:fld>
+            <a:endParaRPr lang="en-US"/>
+          </a:p>
+        </p:txBody>
+      </p:sp>
+    </p:spTree>
+    <p:extLst>
+      <p:ext uri="{BB962C8B-B14F-4D97-AF65-F5344CB8AC3E}">
+        <p14:creationId xmlns:p14="http://schemas.microsoft.com/office/powerpoint/2010/main" val="4173356564"/>
+      </p:ext>
+    </p:extLst>
+  </p:cSld>
+  <p:clrMapOvr>
+    <a:masterClrMapping/>
+  </p:clrMapOvr>
+</p:sldLayout>
+</file>
+
+<file path=ppt/slideLayouts/slideLayout11.xml><?xml version="1.0" encoding="utf-8"?>
 <p:sldLayout xmlns:a="http://schemas.openxmlformats.org/drawingml/2006/main" xmlns:r="http://schemas.openxmlformats.org/officeDocument/2006/relationships" xmlns:p="http://schemas.openxmlformats.org/presentationml/2006/main" type="vertTx" preserve="1">
   <p:cSld name="Title and Vertical Text">
     <p:spTree>
@@ -1018,7 +1094,7 @@
           <a:p>
             <a:fld id="{CCF15043-91C0-B948-9306-70C64EA31C4A}" type="datetimeFigureOut">
               <a:rPr lang="en-US" smtClean="0"/>
-              <a:t>7/1/25</a:t>
+              <a:t>7/10/25</a:t>
             </a:fld>
             <a:endParaRPr lang="en-US"/>
           </a:p>
@@ -1091,217 +1167,9 @@
 </p:sldLayout>
 </file>
 
-<file path=ppt/slideLayouts/slideLayout11.xml><?xml version="1.0" encoding="utf-8"?>
-<p:sldLayout xmlns:a="http://schemas.openxmlformats.org/drawingml/2006/main" xmlns:r="http://schemas.openxmlformats.org/officeDocument/2006/relationships" xmlns:p="http://schemas.openxmlformats.org/presentationml/2006/main" type="vertTitleAndTx" preserve="1">
-  <p:cSld name="Vertical Title and Text">
-    <p:spTree>
-      <p:nvGrpSpPr>
-        <p:cNvPr id="1" name=""/>
-        <p:cNvGrpSpPr/>
-        <p:nvPr/>
-      </p:nvGrpSpPr>
-      <p:grpSpPr>
-        <a:xfrm>
-          <a:off x="0" y="0"/>
-          <a:ext cx="0" cy="0"/>
-          <a:chOff x="0" y="0"/>
-          <a:chExt cx="0" cy="0"/>
-        </a:xfrm>
-      </p:grpSpPr>
-      <p:sp>
-        <p:nvSpPr>
-          <p:cNvPr id="2" name="Vertical Title 1">
-            <a:extLst>
-              <a:ext uri="{FF2B5EF4-FFF2-40B4-BE49-F238E27FC236}">
-                <a16:creationId xmlns:a16="http://schemas.microsoft.com/office/drawing/2014/main" id="{E8038930-2C92-740C-0AFE-5969067ABCDF}"/>
-              </a:ext>
-            </a:extLst>
-          </p:cNvPr>
-          <p:cNvSpPr>
-            <a:spLocks noGrp="1"/>
-          </p:cNvSpPr>
-          <p:nvPr>
-            <p:ph type="title" orient="vert"/>
-          </p:nvPr>
-        </p:nvSpPr>
-        <p:spPr>
-          <a:xfrm>
-            <a:off x="8724900" y="365125"/>
-            <a:ext cx="2628900" cy="5811838"/>
-          </a:xfrm>
-        </p:spPr>
-        <p:txBody>
-          <a:bodyPr vert="eaVert"/>
-          <a:lstStyle/>
-          <a:p>
-            <a:r>
-              <a:rPr lang="en-US"/>
-              <a:t>Click to edit Master title style</a:t>
-            </a:r>
-          </a:p>
-        </p:txBody>
-      </p:sp>
-      <p:sp>
-        <p:nvSpPr>
-          <p:cNvPr id="3" name="Vertical Text Placeholder 2">
-            <a:extLst>
-              <a:ext uri="{FF2B5EF4-FFF2-40B4-BE49-F238E27FC236}">
-                <a16:creationId xmlns:a16="http://schemas.microsoft.com/office/drawing/2014/main" id="{9EB9779F-D94B-5BC7-A27E-E9EFCFDE7A67}"/>
-              </a:ext>
-            </a:extLst>
-          </p:cNvPr>
-          <p:cNvSpPr>
-            <a:spLocks noGrp="1"/>
-          </p:cNvSpPr>
-          <p:nvPr>
-            <p:ph type="body" orient="vert" idx="1"/>
-          </p:nvPr>
-        </p:nvSpPr>
-        <p:spPr>
-          <a:xfrm>
-            <a:off x="838200" y="365125"/>
-            <a:ext cx="7734300" cy="5811838"/>
-          </a:xfrm>
-        </p:spPr>
-        <p:txBody>
-          <a:bodyPr vert="eaVert"/>
-          <a:lstStyle/>
-          <a:p>
-            <a:pPr lvl="0"/>
-            <a:r>
-              <a:rPr lang="en-US"/>
-              <a:t>Click to edit Master text styles</a:t>
-            </a:r>
-          </a:p>
-          <a:p>
-            <a:pPr lvl="1"/>
-            <a:r>
-              <a:rPr lang="en-US"/>
-              <a:t>Second level</a:t>
-            </a:r>
-          </a:p>
-          <a:p>
-            <a:pPr lvl="2"/>
-            <a:r>
-              <a:rPr lang="en-US"/>
-              <a:t>Third level</a:t>
-            </a:r>
-          </a:p>
-          <a:p>
-            <a:pPr lvl="3"/>
-            <a:r>
-              <a:rPr lang="en-US"/>
-              <a:t>Fourth level</a:t>
-            </a:r>
-          </a:p>
-          <a:p>
-            <a:pPr lvl="4"/>
-            <a:r>
-              <a:rPr lang="en-US"/>
-              <a:t>Fifth level</a:t>
-            </a:r>
-          </a:p>
-        </p:txBody>
-      </p:sp>
-      <p:sp>
-        <p:nvSpPr>
-          <p:cNvPr id="4" name="Date Placeholder 3">
-            <a:extLst>
-              <a:ext uri="{FF2B5EF4-FFF2-40B4-BE49-F238E27FC236}">
-                <a16:creationId xmlns:a16="http://schemas.microsoft.com/office/drawing/2014/main" id="{CEC4A7B4-FCA7-65CC-DECD-E68B960C7E11}"/>
-              </a:ext>
-            </a:extLst>
-          </p:cNvPr>
-          <p:cNvSpPr>
-            <a:spLocks noGrp="1"/>
-          </p:cNvSpPr>
-          <p:nvPr>
-            <p:ph type="dt" sz="half" idx="10"/>
-          </p:nvPr>
-        </p:nvSpPr>
-        <p:spPr/>
-        <p:txBody>
-          <a:bodyPr/>
-          <a:lstStyle/>
-          <a:p>
-            <a:fld id="{CCF15043-91C0-B948-9306-70C64EA31C4A}" type="datetimeFigureOut">
-              <a:rPr lang="en-US" smtClean="0"/>
-              <a:t>7/1/25</a:t>
-            </a:fld>
-            <a:endParaRPr lang="en-US"/>
-          </a:p>
-        </p:txBody>
-      </p:sp>
-      <p:sp>
-        <p:nvSpPr>
-          <p:cNvPr id="5" name="Footer Placeholder 4">
-            <a:extLst>
-              <a:ext uri="{FF2B5EF4-FFF2-40B4-BE49-F238E27FC236}">
-                <a16:creationId xmlns:a16="http://schemas.microsoft.com/office/drawing/2014/main" id="{E4126A32-FC94-D6F7-1998-8B06BFB1CD0B}"/>
-              </a:ext>
-            </a:extLst>
-          </p:cNvPr>
-          <p:cNvSpPr>
-            <a:spLocks noGrp="1"/>
-          </p:cNvSpPr>
-          <p:nvPr>
-            <p:ph type="ftr" sz="quarter" idx="11"/>
-          </p:nvPr>
-        </p:nvSpPr>
-        <p:spPr/>
-        <p:txBody>
-          <a:bodyPr/>
-          <a:lstStyle/>
-          <a:p>
-            <a:endParaRPr lang="en-US"/>
-          </a:p>
-        </p:txBody>
-      </p:sp>
-      <p:sp>
-        <p:nvSpPr>
-          <p:cNvPr id="6" name="Slide Number Placeholder 5">
-            <a:extLst>
-              <a:ext uri="{FF2B5EF4-FFF2-40B4-BE49-F238E27FC236}">
-                <a16:creationId xmlns:a16="http://schemas.microsoft.com/office/drawing/2014/main" id="{843176A4-E7E1-BBA2-D416-36E220183EBB}"/>
-              </a:ext>
-            </a:extLst>
-          </p:cNvPr>
-          <p:cNvSpPr>
-            <a:spLocks noGrp="1"/>
-          </p:cNvSpPr>
-          <p:nvPr>
-            <p:ph type="sldNum" sz="quarter" idx="12"/>
-          </p:nvPr>
-        </p:nvSpPr>
-        <p:spPr/>
-        <p:txBody>
-          <a:bodyPr/>
-          <a:lstStyle/>
-          <a:p>
-            <a:fld id="{946DE687-3AD7-5741-8041-7F1F69773D46}" type="slidenum">
-              <a:rPr lang="en-US" smtClean="0"/>
-              <a:t>‹#›</a:t>
-            </a:fld>
-            <a:endParaRPr lang="en-US"/>
-          </a:p>
-        </p:txBody>
-      </p:sp>
-    </p:spTree>
-    <p:extLst>
-      <p:ext uri="{BB962C8B-B14F-4D97-AF65-F5344CB8AC3E}">
-        <p14:creationId xmlns:p14="http://schemas.microsoft.com/office/powerpoint/2010/main" val="1887407663"/>
-      </p:ext>
-    </p:extLst>
-  </p:cSld>
-  <p:clrMapOvr>
-    <a:masterClrMapping/>
-  </p:clrMapOvr>
-</p:sldLayout>
-</file>
-
 <file path=ppt/slideLayouts/slideLayout12.xml><?xml version="1.0" encoding="utf-8"?>
-<p:sldLayout xmlns:a="http://schemas.openxmlformats.org/drawingml/2006/main" xmlns:r="http://schemas.openxmlformats.org/officeDocument/2006/relationships" xmlns:p="http://schemas.openxmlformats.org/presentationml/2006/main" matchingName="Statement Slide" userDrawn="1">
-  <p:cSld name="Statement Slide">
+<p:sldLayout xmlns:a="http://schemas.openxmlformats.org/drawingml/2006/main" xmlns:r="http://schemas.openxmlformats.org/officeDocument/2006/relationships" xmlns:p="http://schemas.openxmlformats.org/presentationml/2006/main" matchingName="Statement Slide" preserve="1" userDrawn="1">
+  <p:cSld name="1_Statement Slide">
     <p:bg>
       <p:bgPr>
         <a:blipFill>
@@ -1360,7 +1228,7 @@
     </p:spTree>
     <p:extLst>
       <p:ext uri="{BB962C8B-B14F-4D97-AF65-F5344CB8AC3E}">
-        <p14:creationId xmlns:p14="http://schemas.microsoft.com/office/powerpoint/2010/main" val="2162938599"/>
+        <p14:creationId xmlns:p14="http://schemas.microsoft.com/office/powerpoint/2010/main" val="1958149542"/>
       </p:ext>
     </p:extLst>
   </p:cSld>
@@ -1371,8 +1239,8 @@
 </file>
 
 <file path=ppt/slideLayouts/slideLayout13.xml><?xml version="1.0" encoding="utf-8"?>
-<p:sldLayout xmlns:a="http://schemas.openxmlformats.org/drawingml/2006/main" xmlns:r="http://schemas.openxmlformats.org/officeDocument/2006/relationships" xmlns:p="http://schemas.openxmlformats.org/presentationml/2006/main" matchingName="Left Title/Body + Right Supporting Image" userDrawn="1">
-  <p:cSld name="Left Title/Body + Right Supporting Image">
+<p:sldLayout xmlns:a="http://schemas.openxmlformats.org/drawingml/2006/main" xmlns:r="http://schemas.openxmlformats.org/officeDocument/2006/relationships" xmlns:p="http://schemas.openxmlformats.org/presentationml/2006/main" matchingName="Left Title/Body + Right Supporting Image" preserve="1" userDrawn="1">
+  <p:cSld name="1_Left Title/Body + Right Supporting Image">
     <p:bg>
       <p:bgPr>
         <a:blipFill>
@@ -1400,11 +1268,864 @@
           <a:chExt cx="0" cy="0"/>
         </a:xfrm>
       </p:grpSpPr>
+    </p:spTree>
+    <p:extLst>
+      <p:ext uri="{BB962C8B-B14F-4D97-AF65-F5344CB8AC3E}">
+        <p14:creationId xmlns:p14="http://schemas.microsoft.com/office/powerpoint/2010/main" val="283119576"/>
+      </p:ext>
+    </p:extLst>
+  </p:cSld>
+  <p:clrMapOvr>
+    <a:masterClrMapping/>
+  </p:clrMapOvr>
+</p:sldLayout>
+</file>
+
+<file path=ppt/slideLayouts/slideLayout14.xml><?xml version="1.0" encoding="utf-8"?>
+<p:sldLayout xmlns:a="http://schemas.openxmlformats.org/drawingml/2006/main" xmlns:r="http://schemas.openxmlformats.org/officeDocument/2006/relationships" xmlns:p="http://schemas.openxmlformats.org/presentationml/2006/main" matchingName="Left Title/Body + Right Supporting Image" preserve="1" userDrawn="1">
+  <p:cSld name="1_Left Title/Body + Right Supporting Image">
+    <p:bg>
+      <p:bgPr>
+        <a:blipFill>
+          <a:blip r:embed="rId2">
+            <a:alphaModFix/>
+          </a:blip>
+          <a:stretch>
+            <a:fillRect/>
+          </a:stretch>
+        </a:blipFill>
+        <a:effectLst/>
+      </p:bgPr>
+    </p:bg>
+    <p:spTree>
+      <p:nvGrpSpPr>
+        <p:cNvPr id="1" name="Shape 13"/>
+        <p:cNvGrpSpPr/>
+        <p:nvPr/>
+      </p:nvGrpSpPr>
+      <p:grpSpPr>
+        <a:xfrm>
+          <a:off x="0" y="0"/>
+          <a:ext cx="0" cy="0"/>
+          <a:chOff x="0" y="0"/>
+          <a:chExt cx="0" cy="0"/>
+        </a:xfrm>
+      </p:grpSpPr>
+      <p:sp>
+        <p:nvSpPr>
+          <p:cNvPr id="2" name="Rectangle 1">
+            <a:extLst>
+              <a:ext uri="{FF2B5EF4-FFF2-40B4-BE49-F238E27FC236}">
+                <a16:creationId xmlns:a16="http://schemas.microsoft.com/office/drawing/2014/main" id="{5BBE4975-074B-3975-2840-F1379247722D}"/>
+              </a:ext>
+            </a:extLst>
+          </p:cNvPr>
+          <p:cNvSpPr/>
+          <p:nvPr userDrawn="1"/>
+        </p:nvSpPr>
+        <p:spPr>
+          <a:xfrm>
+            <a:off x="-35560" y="-16476"/>
+            <a:ext cx="12263120" cy="457200"/>
+          </a:xfrm>
+          <a:prstGeom prst="rect">
+            <a:avLst/>
+          </a:prstGeom>
+          <a:solidFill>
+            <a:srgbClr val="DBDBDB"/>
+          </a:solidFill>
+          <a:ln w="38100" cap="sq" cmpd="sng">
+            <a:solidFill>
+              <a:srgbClr val="DBDBDB"/>
+            </a:solidFill>
+            <a:prstDash val="sysDot"/>
+            <a:miter lim="800000"/>
+          </a:ln>
+        </p:spPr>
+        <p:style>
+          <a:lnRef idx="1">
+            <a:schemeClr val="accent1"/>
+          </a:lnRef>
+          <a:fillRef idx="3">
+            <a:schemeClr val="accent1"/>
+          </a:fillRef>
+          <a:effectRef idx="2">
+            <a:schemeClr val="accent1"/>
+          </a:effectRef>
+          <a:fontRef idx="minor">
+            <a:schemeClr val="lt1"/>
+          </a:fontRef>
+        </p:style>
+        <p:txBody>
+          <a:bodyPr rtlCol="0" anchor="ctr"/>
+          <a:lstStyle/>
+          <a:p>
+            <a:pPr algn="ctr"/>
+            <a:endParaRPr/>
+          </a:p>
+        </p:txBody>
+      </p:sp>
+      <p:sp>
+        <p:nvSpPr>
+          <p:cNvPr id="3" name="TextBox 2">
+            <a:extLst>
+              <a:ext uri="{FF2B5EF4-FFF2-40B4-BE49-F238E27FC236}">
+                <a16:creationId xmlns:a16="http://schemas.microsoft.com/office/drawing/2014/main" id="{3EF14B51-AA0C-2062-60F3-562269E8C792}"/>
+              </a:ext>
+            </a:extLst>
+          </p:cNvPr>
+          <p:cNvSpPr txBox="1"/>
+          <p:nvPr userDrawn="1"/>
+        </p:nvSpPr>
+        <p:spPr>
+          <a:xfrm>
+            <a:off x="183184" y="59576"/>
+            <a:ext cx="3973179" cy="338554"/>
+          </a:xfrm>
+          <a:prstGeom prst="rect">
+            <a:avLst/>
+          </a:prstGeom>
+          <a:noFill/>
+        </p:spPr>
+        <p:txBody>
+          <a:bodyPr wrap="square" anchor="ctr">
+            <a:spAutoFit/>
+          </a:bodyPr>
+          <a:lstStyle/>
+          <a:p>
+            <a:pPr>
+              <a:defRPr sz="1400" b="1">
+                <a:latin typeface="Red Hat Display Black"/>
+              </a:defRPr>
+            </a:pPr>
+            <a:r>
+              <a:rPr lang="en-US" sz="1600" dirty="0"/>
+              <a:t>Sponsorship Insights Report</a:t>
+            </a:r>
+            <a:endParaRPr sz="1600" dirty="0"/>
+          </a:p>
+        </p:txBody>
+      </p:sp>
+      <p:sp>
+        <p:nvSpPr>
+          <p:cNvPr id="4" name="TextBox 3">
+            <a:extLst>
+              <a:ext uri="{FF2B5EF4-FFF2-40B4-BE49-F238E27FC236}">
+                <a16:creationId xmlns:a16="http://schemas.microsoft.com/office/drawing/2014/main" id="{1FD8149D-9105-03BD-F818-1AA583A57A43}"/>
+              </a:ext>
+            </a:extLst>
+          </p:cNvPr>
+          <p:cNvSpPr txBox="1"/>
+          <p:nvPr userDrawn="1"/>
+        </p:nvSpPr>
+        <p:spPr>
+          <a:xfrm>
+            <a:off x="5266944" y="121130"/>
+            <a:ext cx="6741872" cy="246221"/>
+          </a:xfrm>
+          <a:prstGeom prst="rect">
+            <a:avLst/>
+          </a:prstGeom>
+          <a:noFill/>
+        </p:spPr>
+        <p:txBody>
+          <a:bodyPr wrap="square" anchor="ctr">
+            <a:spAutoFit/>
+          </a:bodyPr>
+          <a:lstStyle/>
+          <a:p>
+            <a:pPr algn="r">
+              <a:defRPr sz="1400">
+                <a:latin typeface="Red Hat Display Medium"/>
+              </a:defRPr>
+            </a:pPr>
+            <a:r>
+              <a:rPr lang="en-US" sz="1000" b="1" spc="200" dirty="0">
+                <a:latin typeface="Overpass Black" pitchFamily="2" charset="77"/>
+              </a:rPr>
+              <a:t>HOW TO USE THIS REPORT</a:t>
+            </a:r>
+          </a:p>
+        </p:txBody>
+      </p:sp>
+      <p:sp>
+        <p:nvSpPr>
+          <p:cNvPr id="5" name="TextBox 4">
+            <a:extLst>
+              <a:ext uri="{FF2B5EF4-FFF2-40B4-BE49-F238E27FC236}">
+                <a16:creationId xmlns:a16="http://schemas.microsoft.com/office/drawing/2014/main" id="{7DA79522-4CBE-A213-66CA-586D715B2B07}"/>
+              </a:ext>
+            </a:extLst>
+          </p:cNvPr>
+          <p:cNvSpPr txBox="1"/>
+          <p:nvPr userDrawn="1"/>
+        </p:nvSpPr>
+        <p:spPr>
+          <a:xfrm>
+            <a:off x="609216" y="1018593"/>
+            <a:ext cx="5170411" cy="970074"/>
+          </a:xfrm>
+          <a:prstGeom prst="rect">
+            <a:avLst/>
+          </a:prstGeom>
+          <a:noFill/>
+        </p:spPr>
+        <p:txBody>
+          <a:bodyPr wrap="square" anchor="ctr">
+            <a:noAutofit/>
+          </a:bodyPr>
+          <a:lstStyle/>
+          <a:p>
+            <a:pPr>
+              <a:defRPr sz="1400" b="1">
+                <a:latin typeface="Red Hat Display Black"/>
+              </a:defRPr>
+            </a:pPr>
+            <a:r>
+              <a:rPr lang="en-US" sz="3200" dirty="0"/>
+              <a:t>How To Use This Report</a:t>
+            </a:r>
+            <a:endParaRPr sz="3200" dirty="0"/>
+          </a:p>
+        </p:txBody>
+      </p:sp>
+      <p:sp>
+        <p:nvSpPr>
+          <p:cNvPr id="6" name="TextBox 5">
+            <a:extLst>
+              <a:ext uri="{FF2B5EF4-FFF2-40B4-BE49-F238E27FC236}">
+                <a16:creationId xmlns:a16="http://schemas.microsoft.com/office/drawing/2014/main" id="{D4E4F46D-65B3-1AB2-12E4-60161D0A3FC5}"/>
+              </a:ext>
+            </a:extLst>
+          </p:cNvPr>
+          <p:cNvSpPr txBox="1"/>
+          <p:nvPr userDrawn="1"/>
+        </p:nvSpPr>
+        <p:spPr>
+          <a:xfrm>
+            <a:off x="609216" y="1827967"/>
+            <a:ext cx="10363584" cy="738664"/>
+          </a:xfrm>
+          <a:prstGeom prst="rect">
+            <a:avLst/>
+          </a:prstGeom>
+          <a:noFill/>
+        </p:spPr>
+        <p:txBody>
+          <a:bodyPr wrap="square">
+            <a:spAutoFit/>
+          </a:bodyPr>
+          <a:lstStyle/>
+          <a:p>
+            <a:pPr fontAlgn="base">
+              <a:lnSpc>
+                <a:spcPct val="100000"/>
+              </a:lnSpc>
+              <a:spcAft>
+                <a:spcPts val="600"/>
+              </a:spcAft>
+              <a:defRPr sz="1000">
+                <a:latin typeface="Red Hat Display Medium"/>
+              </a:defRPr>
+            </a:pPr>
+            <a:r>
+              <a:rPr lang="en-US" sz="1400" b="1" dirty="0">
+                <a:latin typeface="Red Hat Display Black" panose="02010303040201060303" pitchFamily="2" charset="0"/>
+                <a:ea typeface="Red Hat Display Black" panose="02010303040201060303" pitchFamily="2" charset="0"/>
+                <a:cs typeface="Red Hat Display Black" panose="02010303040201060303" pitchFamily="2" charset="0"/>
+              </a:rPr>
+              <a:t>This report is the definitive playbook for sponsorship strategy—backed by real fan data. </a:t>
+            </a:r>
+            <a:r>
+              <a:rPr lang="en-US" sz="1400" dirty="0">
+                <a:latin typeface="Red Hat Display Medium" panose="02010303040201060303" pitchFamily="2" charset="0"/>
+                <a:ea typeface="Red Hat Display Medium" panose="02010303040201060303" pitchFamily="2" charset="0"/>
+                <a:cs typeface="Red Hat Display Medium" panose="02010303040201060303" pitchFamily="2" charset="0"/>
+              </a:rPr>
+              <a:t>It reveals exactly who a team’s fans are, from their demographics to the communities they belong to, to the categories and brands they buy. For brands and agencies, it’s the insight you need to decide where to invest. For teams, it’s the proof you need to show why that investment delivers.</a:t>
+            </a:r>
+            <a:endParaRPr sz="1400" dirty="0">
+              <a:latin typeface="Red Hat Display Medium" panose="02010303040201060303" pitchFamily="2" charset="0"/>
+              <a:ea typeface="Red Hat Display Medium" panose="02010303040201060303" pitchFamily="2" charset="0"/>
+              <a:cs typeface="Red Hat Display Medium" panose="02010303040201060303" pitchFamily="2" charset="0"/>
+            </a:endParaRPr>
+          </a:p>
+        </p:txBody>
+      </p:sp>
+      <p:sp>
+        <p:nvSpPr>
+          <p:cNvPr id="7" name="TextBox 6">
+            <a:extLst>
+              <a:ext uri="{FF2B5EF4-FFF2-40B4-BE49-F238E27FC236}">
+                <a16:creationId xmlns:a16="http://schemas.microsoft.com/office/drawing/2014/main" id="{92C2417E-7537-FE8C-880C-891BD10B4A94}"/>
+              </a:ext>
+            </a:extLst>
+          </p:cNvPr>
+          <p:cNvSpPr txBox="1"/>
+          <p:nvPr userDrawn="1"/>
+        </p:nvSpPr>
+        <p:spPr>
+          <a:xfrm>
+            <a:off x="565674" y="3657602"/>
+            <a:ext cx="2257473" cy="2492990"/>
+          </a:xfrm>
+          <a:prstGeom prst="rect">
+            <a:avLst/>
+          </a:prstGeom>
+          <a:noFill/>
+        </p:spPr>
+        <p:txBody>
+          <a:bodyPr wrap="square">
+            <a:spAutoFit/>
+          </a:bodyPr>
+          <a:lstStyle/>
+          <a:p>
+            <a:pPr algn="ctr"/>
+            <a:r>
+              <a:rPr lang="en-US" sz="1200" b="1" i="0" u="none" strike="noStrike" dirty="0">
+                <a:solidFill>
+                  <a:srgbClr val="000000"/>
+                </a:solidFill>
+                <a:effectLst/>
+                <a:latin typeface="Red Hat Display Black" panose="02010303040201060303" pitchFamily="2" charset="0"/>
+                <a:ea typeface="Red Hat Display Black" panose="02010303040201060303" pitchFamily="2" charset="0"/>
+                <a:cs typeface="Red Hat Display Black" panose="02010303040201060303" pitchFamily="2" charset="0"/>
+              </a:rPr>
+              <a:t>Pinpoint the Highest-Value Sponsorship Opportunities</a:t>
+            </a:r>
+          </a:p>
+          <a:p>
+            <a:br>
+              <a:rPr lang="en-US" sz="1200" dirty="0">
+                <a:latin typeface="Red Hat Display Medium" panose="02010303040201060303" pitchFamily="2" charset="0"/>
+                <a:ea typeface="Red Hat Display Medium" panose="02010303040201060303" pitchFamily="2" charset="0"/>
+                <a:cs typeface="Red Hat Display Medium" panose="02010303040201060303" pitchFamily="2" charset="0"/>
+              </a:rPr>
+            </a:br>
+            <a:r>
+              <a:rPr lang="en-US" sz="1200" b="0" i="0" u="none" strike="noStrike" dirty="0">
+                <a:solidFill>
+                  <a:srgbClr val="000000"/>
+                </a:solidFill>
+                <a:effectLst/>
+                <a:latin typeface="Red Hat Display Medium" panose="02010303040201060303" pitchFamily="2" charset="0"/>
+                <a:ea typeface="Red Hat Display Medium" panose="02010303040201060303" pitchFamily="2" charset="0"/>
+                <a:cs typeface="Red Hat Display Medium" panose="02010303040201060303" pitchFamily="2" charset="0"/>
+              </a:rPr>
+              <a:t>Identify the categories where your fans over-index in actual spending. This report highlights the brand verticals most aligned with your fan base, allowing teams to prioritize outreach and focus sales efforts—and enabling brands to target where the return is highest.</a:t>
+            </a:r>
+            <a:endParaRPr lang="en-US" sz="1200" dirty="0">
+              <a:latin typeface="Red Hat Display Medium" panose="02010303040201060303" pitchFamily="2" charset="0"/>
+              <a:ea typeface="Red Hat Display Medium" panose="02010303040201060303" pitchFamily="2" charset="0"/>
+              <a:cs typeface="Red Hat Display Medium" panose="02010303040201060303" pitchFamily="2" charset="0"/>
+            </a:endParaRPr>
+          </a:p>
+        </p:txBody>
+      </p:sp>
+      <p:sp>
+        <p:nvSpPr>
+          <p:cNvPr id="8" name="TextBox 7">
+            <a:extLst>
+              <a:ext uri="{FF2B5EF4-FFF2-40B4-BE49-F238E27FC236}">
+                <a16:creationId xmlns:a16="http://schemas.microsoft.com/office/drawing/2014/main" id="{4A654AB0-8ADD-6EF3-6ECB-1B70A4129B39}"/>
+              </a:ext>
+            </a:extLst>
+          </p:cNvPr>
+          <p:cNvSpPr txBox="1"/>
+          <p:nvPr userDrawn="1"/>
+        </p:nvSpPr>
+        <p:spPr>
+          <a:xfrm>
+            <a:off x="3341501" y="3657602"/>
+            <a:ext cx="2257473" cy="2492990"/>
+          </a:xfrm>
+          <a:prstGeom prst="rect">
+            <a:avLst/>
+          </a:prstGeom>
+          <a:noFill/>
+        </p:spPr>
+        <p:txBody>
+          <a:bodyPr wrap="square">
+            <a:spAutoFit/>
+          </a:bodyPr>
+          <a:lstStyle/>
+          <a:p>
+            <a:pPr algn="ctr"/>
+            <a:r>
+              <a:rPr lang="en-US" sz="1200" b="1" dirty="0">
+                <a:latin typeface="Red Hat Display Black" panose="02010303040201060303" pitchFamily="2" charset="0"/>
+                <a:ea typeface="Red Hat Display Black" panose="02010303040201060303" pitchFamily="2" charset="0"/>
+                <a:cs typeface="Red Hat Display Black" panose="02010303040201060303" pitchFamily="2" charset="0"/>
+              </a:rPr>
+              <a:t>Build Data-Driven Collateral That Closes</a:t>
+            </a:r>
+          </a:p>
+          <a:p>
+            <a:br>
+              <a:rPr lang="en-US" sz="1200" dirty="0">
+                <a:latin typeface="Red Hat Display Medium" panose="02010303040201060303" pitchFamily="2" charset="0"/>
+                <a:ea typeface="Red Hat Display Medium" panose="02010303040201060303" pitchFamily="2" charset="0"/>
+                <a:cs typeface="Red Hat Display Medium" panose="02010303040201060303" pitchFamily="2" charset="0"/>
+              </a:rPr>
+            </a:br>
+            <a:r>
+              <a:rPr lang="en-US" sz="1200" dirty="0">
+                <a:latin typeface="Red Hat Display Medium" panose="02010303040201060303" pitchFamily="2" charset="0"/>
+                <a:ea typeface="Red Hat Display Medium" panose="02010303040201060303" pitchFamily="2" charset="0"/>
+                <a:cs typeface="Red Hat Display Medium" panose="02010303040201060303" pitchFamily="2" charset="0"/>
+              </a:rPr>
+              <a:t>Leverage brand-level spending insights—including how many fans are buying, how often they buy, and how behavior compares to the local market. Use this data to create tailored sales and marketing materials that resonate with decision-makers and drive results.</a:t>
+            </a:r>
+          </a:p>
+        </p:txBody>
+      </p:sp>
+      <p:sp>
+        <p:nvSpPr>
+          <p:cNvPr id="9" name="TextBox 8">
+            <a:extLst>
+              <a:ext uri="{FF2B5EF4-FFF2-40B4-BE49-F238E27FC236}">
+                <a16:creationId xmlns:a16="http://schemas.microsoft.com/office/drawing/2014/main" id="{DB82AEB0-9B68-DB17-4FE5-DB6CE7DE42BE}"/>
+              </a:ext>
+            </a:extLst>
+          </p:cNvPr>
+          <p:cNvSpPr txBox="1"/>
+          <p:nvPr userDrawn="1"/>
+        </p:nvSpPr>
+        <p:spPr>
+          <a:xfrm>
+            <a:off x="6117328" y="3657602"/>
+            <a:ext cx="2257473" cy="2492990"/>
+          </a:xfrm>
+          <a:prstGeom prst="rect">
+            <a:avLst/>
+          </a:prstGeom>
+          <a:noFill/>
+        </p:spPr>
+        <p:txBody>
+          <a:bodyPr wrap="square">
+            <a:spAutoFit/>
+          </a:bodyPr>
+          <a:lstStyle/>
+          <a:p>
+            <a:pPr algn="ctr"/>
+            <a:r>
+              <a:rPr lang="en-US" sz="1200" b="1" dirty="0">
+                <a:latin typeface="Red Hat Display Black" panose="02010303040201060303" pitchFamily="2" charset="0"/>
+                <a:ea typeface="Red Hat Display Black" panose="02010303040201060303" pitchFamily="2" charset="0"/>
+                <a:cs typeface="Red Hat Display Black" panose="02010303040201060303" pitchFamily="2" charset="0"/>
+              </a:rPr>
+              <a:t>Prove and Benchmark Sponsorship ROI</a:t>
+            </a:r>
+          </a:p>
+          <a:p>
+            <a:br>
+              <a:rPr lang="en-US" sz="1200" dirty="0">
+                <a:latin typeface="Red Hat Display Medium" panose="02010303040201060303" pitchFamily="2" charset="0"/>
+                <a:ea typeface="Red Hat Display Medium" panose="02010303040201060303" pitchFamily="2" charset="0"/>
+                <a:cs typeface="Red Hat Display Medium" panose="02010303040201060303" pitchFamily="2" charset="0"/>
+              </a:rPr>
+            </a:br>
+            <a:r>
+              <a:rPr lang="en-US" sz="1200" dirty="0">
+                <a:latin typeface="Red Hat Display Medium" panose="02010303040201060303" pitchFamily="2" charset="0"/>
+                <a:ea typeface="Red Hat Display Medium" panose="02010303040201060303" pitchFamily="2" charset="0"/>
+                <a:cs typeface="Red Hat Display Medium" panose="02010303040201060303" pitchFamily="2" charset="0"/>
+              </a:rPr>
+              <a:t>For existing sponsors, this report offers concrete data on how your fans are spending with their brand—essential for demonstrating ROI, securing renewals, and setting performance benchmarks. For prospective partners, it’s credible, third-party evidence of real fan value.</a:t>
+            </a:r>
+          </a:p>
+        </p:txBody>
+      </p:sp>
+      <p:sp>
+        <p:nvSpPr>
+          <p:cNvPr id="10" name="TextBox 9">
+            <a:extLst>
+              <a:ext uri="{FF2B5EF4-FFF2-40B4-BE49-F238E27FC236}">
+                <a16:creationId xmlns:a16="http://schemas.microsoft.com/office/drawing/2014/main" id="{2696EC69-8776-6883-9DCB-5CEED6F4FF59}"/>
+              </a:ext>
+            </a:extLst>
+          </p:cNvPr>
+          <p:cNvSpPr txBox="1"/>
+          <p:nvPr userDrawn="1"/>
+        </p:nvSpPr>
+        <p:spPr>
+          <a:xfrm>
+            <a:off x="8893155" y="3657602"/>
+            <a:ext cx="2257473" cy="2492990"/>
+          </a:xfrm>
+          <a:prstGeom prst="rect">
+            <a:avLst/>
+          </a:prstGeom>
+          <a:noFill/>
+        </p:spPr>
+        <p:txBody>
+          <a:bodyPr wrap="square">
+            <a:spAutoFit/>
+          </a:bodyPr>
+          <a:lstStyle/>
+          <a:p>
+            <a:pPr algn="ctr"/>
+            <a:r>
+              <a:rPr lang="en-US" sz="1200" b="1" dirty="0">
+                <a:latin typeface="Red Hat Display Black" panose="02010303040201060303" pitchFamily="2" charset="0"/>
+                <a:ea typeface="Red Hat Display Black" panose="02010303040201060303" pitchFamily="2" charset="0"/>
+                <a:cs typeface="Red Hat Display Black" panose="02010303040201060303" pitchFamily="2" charset="0"/>
+              </a:rPr>
+              <a:t>Validate Brand and Category Alignment</a:t>
+            </a:r>
+          </a:p>
+          <a:p>
+            <a:br>
+              <a:rPr lang="en-US" sz="1200" dirty="0">
+                <a:latin typeface="Red Hat Display Medium" panose="02010303040201060303" pitchFamily="2" charset="0"/>
+                <a:ea typeface="Red Hat Display Medium" panose="02010303040201060303" pitchFamily="2" charset="0"/>
+                <a:cs typeface="Red Hat Display Medium" panose="02010303040201060303" pitchFamily="2" charset="0"/>
+              </a:rPr>
+            </a:br>
+            <a:r>
+              <a:rPr lang="en-US" sz="1200" dirty="0">
+                <a:latin typeface="Red Hat Display Medium" panose="02010303040201060303" pitchFamily="2" charset="0"/>
+                <a:ea typeface="Red Hat Display Medium" panose="02010303040201060303" pitchFamily="2" charset="0"/>
+                <a:cs typeface="Red Hat Display Medium" panose="02010303040201060303" pitchFamily="2" charset="0"/>
+              </a:rPr>
+              <a:t>This report helps brands and agencies determine whether a team’s fans are spending in their category, with their brand, or with competitors. It’s a powerful tool for validating fit, optimizing sponsorship selection, and making more informed investment decisions.</a:t>
+            </a:r>
+          </a:p>
+        </p:txBody>
+      </p:sp>
+      <p:sp>
+        <p:nvSpPr>
+          <p:cNvPr id="11" name="TextBox 10">
+            <a:extLst>
+              <a:ext uri="{FF2B5EF4-FFF2-40B4-BE49-F238E27FC236}">
+                <a16:creationId xmlns:a16="http://schemas.microsoft.com/office/drawing/2014/main" id="{65EA24BA-BEBD-0F90-43FB-FDB30AA87E4A}"/>
+              </a:ext>
+            </a:extLst>
+          </p:cNvPr>
+          <p:cNvSpPr txBox="1"/>
+          <p:nvPr userDrawn="1"/>
+        </p:nvSpPr>
+        <p:spPr>
+          <a:xfrm>
+            <a:off x="2701147" y="2818028"/>
+            <a:ext cx="6156960" cy="261610"/>
+          </a:xfrm>
+          <a:prstGeom prst="rect">
+            <a:avLst/>
+          </a:prstGeom>
+          <a:noFill/>
+        </p:spPr>
+        <p:txBody>
+          <a:bodyPr wrap="square">
+            <a:spAutoFit/>
+          </a:bodyPr>
+          <a:lstStyle/>
+          <a:p>
+            <a:pPr algn="ctr">
+              <a:defRPr sz="1400" b="1">
+                <a:latin typeface="Red Hat Display Black"/>
+              </a:defRPr>
+            </a:pPr>
+            <a:r>
+              <a:rPr lang="en-US" sz="1100" spc="300" dirty="0">
+                <a:latin typeface="Overpass Medium" pitchFamily="2" charset="77"/>
+              </a:rPr>
+              <a:t>UTILIZE THIS REPORT TO</a:t>
+            </a:r>
+          </a:p>
+        </p:txBody>
+      </p:sp>
+      <p:cxnSp>
+        <p:nvCxnSpPr>
+          <p:cNvPr id="12" name="Straight Connector 11">
+            <a:extLst>
+              <a:ext uri="{FF2B5EF4-FFF2-40B4-BE49-F238E27FC236}">
+                <a16:creationId xmlns:a16="http://schemas.microsoft.com/office/drawing/2014/main" id="{1F10F685-A484-B848-2507-981483441E13}"/>
+              </a:ext>
+            </a:extLst>
+          </p:cNvPr>
+          <p:cNvCxnSpPr/>
+          <p:nvPr userDrawn="1"/>
+        </p:nvCxnSpPr>
+        <p:spPr>
+          <a:xfrm flipH="1">
+            <a:off x="1622721" y="2948833"/>
+            <a:ext cx="2692400" cy="0"/>
+          </a:xfrm>
+          <a:prstGeom prst="line">
+            <a:avLst/>
+          </a:prstGeom>
+          <a:ln>
+            <a:solidFill>
+              <a:schemeClr val="tx2">
+                <a:lumMod val="25000"/>
+                <a:lumOff val="75000"/>
+              </a:schemeClr>
+            </a:solidFill>
+            <a:prstDash val="sysDot"/>
+          </a:ln>
+        </p:spPr>
+        <p:style>
+          <a:lnRef idx="2">
+            <a:schemeClr val="accent1"/>
+          </a:lnRef>
+          <a:fillRef idx="0">
+            <a:schemeClr val="accent1"/>
+          </a:fillRef>
+          <a:effectRef idx="1">
+            <a:schemeClr val="accent1"/>
+          </a:effectRef>
+          <a:fontRef idx="minor">
+            <a:schemeClr val="tx1"/>
+          </a:fontRef>
+        </p:style>
+      </p:cxnSp>
+      <p:cxnSp>
+        <p:nvCxnSpPr>
+          <p:cNvPr id="13" name="Straight Connector 12">
+            <a:extLst>
+              <a:ext uri="{FF2B5EF4-FFF2-40B4-BE49-F238E27FC236}">
+                <a16:creationId xmlns:a16="http://schemas.microsoft.com/office/drawing/2014/main" id="{A2E91336-3B3A-5120-43EC-8FEF509F5CF4}"/>
+              </a:ext>
+            </a:extLst>
+          </p:cNvPr>
+          <p:cNvCxnSpPr/>
+          <p:nvPr userDrawn="1"/>
+        </p:nvCxnSpPr>
+        <p:spPr>
+          <a:xfrm flipH="1">
+            <a:off x="7206239" y="2948833"/>
+            <a:ext cx="2692400" cy="0"/>
+          </a:xfrm>
+          <a:prstGeom prst="line">
+            <a:avLst/>
+          </a:prstGeom>
+          <a:ln>
+            <a:solidFill>
+              <a:schemeClr val="tx2">
+                <a:lumMod val="25000"/>
+                <a:lumOff val="75000"/>
+              </a:schemeClr>
+            </a:solidFill>
+            <a:prstDash val="sysDot"/>
+          </a:ln>
+        </p:spPr>
+        <p:style>
+          <a:lnRef idx="2">
+            <a:schemeClr val="accent1"/>
+          </a:lnRef>
+          <a:fillRef idx="0">
+            <a:schemeClr val="accent1"/>
+          </a:fillRef>
+          <a:effectRef idx="1">
+            <a:schemeClr val="accent1"/>
+          </a:effectRef>
+          <a:fontRef idx="minor">
+            <a:schemeClr val="tx1"/>
+          </a:fontRef>
+        </p:style>
+      </p:cxnSp>
       <p:pic>
         <p:nvPicPr>
-          <p:cNvPr id="17" name="Google Shape;17;p3"/>
-          <p:cNvPicPr preferRelativeResize="0"/>
-          <p:nvPr/>
+          <p:cNvPr id="14" name="Graphic 13">
+            <a:extLst>
+              <a:ext uri="{FF2B5EF4-FFF2-40B4-BE49-F238E27FC236}">
+                <a16:creationId xmlns:a16="http://schemas.microsoft.com/office/drawing/2014/main" id="{5CF03467-2810-0514-5521-B159CD501ECD}"/>
+              </a:ext>
+            </a:extLst>
+          </p:cNvPr>
+          <p:cNvPicPr>
+            <a:picLocks noChangeAspect="1"/>
+          </p:cNvPicPr>
+          <p:nvPr userDrawn="1"/>
+        </p:nvPicPr>
+        <p:blipFill>
+          <a:blip r:embed="rId3">
+            <a:extLst>
+              <a:ext uri="{96DAC541-7B7A-43D3-8B79-37D633B846F1}">
+                <asvg:svgBlip xmlns:asvg="http://schemas.microsoft.com/office/drawing/2016/SVG/main" r:embed="rId4"/>
+              </a:ext>
+            </a:extLst>
+          </a:blip>
+          <a:stretch>
+            <a:fillRect/>
+          </a:stretch>
+        </p:blipFill>
+        <p:spPr>
+          <a:xfrm>
+            <a:off x="1513487" y="3203475"/>
+            <a:ext cx="361846" cy="361846"/>
+          </a:xfrm>
+          <a:prstGeom prst="rect">
+            <a:avLst/>
+          </a:prstGeom>
+        </p:spPr>
+      </p:pic>
+      <p:pic>
+        <p:nvPicPr>
+          <p:cNvPr id="15" name="Graphic 14">
+            <a:extLst>
+              <a:ext uri="{FF2B5EF4-FFF2-40B4-BE49-F238E27FC236}">
+                <a16:creationId xmlns:a16="http://schemas.microsoft.com/office/drawing/2014/main" id="{4FBA535E-0CA4-F781-8AB1-60731FC2EAC5}"/>
+              </a:ext>
+            </a:extLst>
+          </p:cNvPr>
+          <p:cNvPicPr>
+            <a:picLocks noChangeAspect="1"/>
+          </p:cNvPicPr>
+          <p:nvPr userDrawn="1"/>
+        </p:nvPicPr>
+        <p:blipFill>
+          <a:blip r:embed="rId5">
+            <a:extLst>
+              <a:ext uri="{96DAC541-7B7A-43D3-8B79-37D633B846F1}">
+                <asvg:svgBlip xmlns:asvg="http://schemas.microsoft.com/office/drawing/2016/SVG/main" r:embed="rId6"/>
+              </a:ext>
+            </a:extLst>
+          </a:blip>
+          <a:stretch>
+            <a:fillRect/>
+          </a:stretch>
+        </p:blipFill>
+        <p:spPr>
+          <a:xfrm>
+            <a:off x="4227359" y="3203475"/>
+            <a:ext cx="485755" cy="388604"/>
+          </a:xfrm>
+          <a:prstGeom prst="rect">
+            <a:avLst/>
+          </a:prstGeom>
+        </p:spPr>
+      </p:pic>
+      <p:pic>
+        <p:nvPicPr>
+          <p:cNvPr id="16" name="Graphic 15">
+            <a:extLst>
+              <a:ext uri="{FF2B5EF4-FFF2-40B4-BE49-F238E27FC236}">
+                <a16:creationId xmlns:a16="http://schemas.microsoft.com/office/drawing/2014/main" id="{7E163514-89A9-0C0D-6259-684CB18884E0}"/>
+              </a:ext>
+            </a:extLst>
+          </p:cNvPr>
+          <p:cNvPicPr>
+            <a:picLocks noChangeAspect="1"/>
+          </p:cNvPicPr>
+          <p:nvPr userDrawn="1"/>
+        </p:nvPicPr>
+        <p:blipFill>
+          <a:blip r:embed="rId7">
+            <a:extLst>
+              <a:ext uri="{96DAC541-7B7A-43D3-8B79-37D633B846F1}">
+                <asvg:svgBlip xmlns:asvg="http://schemas.microsoft.com/office/drawing/2016/SVG/main" r:embed="rId8"/>
+              </a:ext>
+            </a:extLst>
+          </a:blip>
+          <a:stretch>
+            <a:fillRect/>
+          </a:stretch>
+        </p:blipFill>
+        <p:spPr>
+          <a:xfrm>
+            <a:off x="7091590" y="3199575"/>
+            <a:ext cx="308947" cy="353082"/>
+          </a:xfrm>
+          <a:prstGeom prst="rect">
+            <a:avLst/>
+          </a:prstGeom>
+        </p:spPr>
+      </p:pic>
+      <p:pic>
+        <p:nvPicPr>
+          <p:cNvPr id="17" name="Graphic 16">
+            <a:extLst>
+              <a:ext uri="{FF2B5EF4-FFF2-40B4-BE49-F238E27FC236}">
+                <a16:creationId xmlns:a16="http://schemas.microsoft.com/office/drawing/2014/main" id="{00A8CE0B-95CE-93D6-56C9-481738D1CC77}"/>
+              </a:ext>
+            </a:extLst>
+          </p:cNvPr>
+          <p:cNvPicPr>
+            <a:picLocks noChangeAspect="1"/>
+          </p:cNvPicPr>
+          <p:nvPr userDrawn="1"/>
+        </p:nvPicPr>
+        <p:blipFill>
+          <a:blip r:embed="rId9">
+            <a:extLst>
+              <a:ext uri="{96DAC541-7B7A-43D3-8B79-37D633B846F1}">
+                <asvg:svgBlip xmlns:asvg="http://schemas.microsoft.com/office/drawing/2016/SVG/main" r:embed="rId10"/>
+              </a:ext>
+            </a:extLst>
+          </a:blip>
+          <a:stretch>
+            <a:fillRect/>
+          </a:stretch>
+        </p:blipFill>
+        <p:spPr>
+          <a:xfrm>
+            <a:off x="9867417" y="3199575"/>
+            <a:ext cx="308947" cy="353082"/>
+          </a:xfrm>
+          <a:prstGeom prst="rect">
+            <a:avLst/>
+          </a:prstGeom>
+        </p:spPr>
+      </p:pic>
+    </p:spTree>
+    <p:extLst>
+      <p:ext uri="{BB962C8B-B14F-4D97-AF65-F5344CB8AC3E}">
+        <p14:creationId xmlns:p14="http://schemas.microsoft.com/office/powerpoint/2010/main" val="696694307"/>
+      </p:ext>
+    </p:extLst>
+  </p:cSld>
+  <p:clrMapOvr>
+    <a:masterClrMapping/>
+  </p:clrMapOvr>
+</p:sldLayout>
+</file>
+
+<file path=ppt/slideLayouts/slideLayout15.xml><?xml version="1.0" encoding="utf-8"?>
+<p:sldLayout xmlns:a="http://schemas.openxmlformats.org/drawingml/2006/main" xmlns:r="http://schemas.openxmlformats.org/officeDocument/2006/relationships" xmlns:p="http://schemas.openxmlformats.org/presentationml/2006/main" matchingName="Left Title/Body + Right Supporting Image" preserve="1" userDrawn="1">
+  <p:cSld name="1_Left Title/Body + Right Supporting Image">
+    <p:bg>
+      <p:bgPr>
+        <a:blipFill dpi="0" rotWithShape="1">
+          <a:blip r:embed="rId2">
+            <a:lum/>
+          </a:blip>
+          <a:srcRect/>
+          <a:stretch>
+            <a:fillRect/>
+          </a:stretch>
+        </a:blipFill>
+        <a:effectLst/>
+      </p:bgPr>
+    </p:bg>
+    <p:spTree>
+      <p:nvGrpSpPr>
+        <p:cNvPr id="1" name="Shape 13"/>
+        <p:cNvGrpSpPr/>
+        <p:nvPr/>
+      </p:nvGrpSpPr>
+      <p:grpSpPr>
+        <a:xfrm>
+          <a:off x="0" y="0"/>
+          <a:ext cx="0" cy="0"/>
+          <a:chOff x="0" y="0"/>
+          <a:chExt cx="0" cy="0"/>
+        </a:xfrm>
+      </p:grpSpPr>
+      <p:pic>
+        <p:nvPicPr>
+          <p:cNvPr id="19" name="Picture 18">
+            <a:extLst>
+              <a:ext uri="{FF2B5EF4-FFF2-40B4-BE49-F238E27FC236}">
+                <a16:creationId xmlns:a16="http://schemas.microsoft.com/office/drawing/2014/main" id="{77D0880C-1839-3FB6-07AC-BB09A08FFE2C}"/>
+              </a:ext>
+            </a:extLst>
+          </p:cNvPr>
+          <p:cNvPicPr>
+            <a:picLocks noChangeAspect="1"/>
+          </p:cNvPicPr>
+          <p:nvPr userDrawn="1"/>
         </p:nvPicPr>
         <p:blipFill>
           <a:blip r:embed="rId3">
@@ -1416,22 +2137,50 @@
         </p:blipFill>
         <p:spPr>
           <a:xfrm>
-            <a:off x="176698" y="6531803"/>
-            <a:ext cx="1665967" cy="226933"/>
+            <a:off x="4005290" y="2478024"/>
+            <a:ext cx="4181420" cy="1901952"/>
+          </a:xfrm>
+          <a:prstGeom prst="rect">
+            <a:avLst/>
+          </a:prstGeom>
+        </p:spPr>
+      </p:pic>
+      <p:sp>
+        <p:nvSpPr>
+          <p:cNvPr id="20" name="TextBox 19">
+            <a:extLst>
+              <a:ext uri="{FF2B5EF4-FFF2-40B4-BE49-F238E27FC236}">
+                <a16:creationId xmlns:a16="http://schemas.microsoft.com/office/drawing/2014/main" id="{4FEAE071-07A9-7402-8A81-E754F5F39EEA}"/>
+              </a:ext>
+            </a:extLst>
+          </p:cNvPr>
+          <p:cNvSpPr txBox="1"/>
+          <p:nvPr userDrawn="1"/>
+        </p:nvSpPr>
+        <p:spPr>
+          <a:xfrm>
+            <a:off x="11788346" y="4337222"/>
+            <a:ext cx="184731" cy="369332"/>
           </a:xfrm>
           <a:prstGeom prst="rect">
             <a:avLst/>
           </a:prstGeom>
           <a:noFill/>
-          <a:ln>
-            <a:noFill/>
-          </a:ln>
         </p:spPr>
-      </p:pic>
+        <p:txBody>
+          <a:bodyPr wrap="none" rtlCol="0">
+            <a:spAutoFit/>
+          </a:bodyPr>
+          <a:lstStyle/>
+          <a:p>
+            <a:endParaRPr lang="en-US" dirty="0"/>
+          </a:p>
+        </p:txBody>
+      </p:sp>
     </p:spTree>
     <p:extLst>
       <p:ext uri="{BB962C8B-B14F-4D97-AF65-F5344CB8AC3E}">
-        <p14:creationId xmlns:p14="http://schemas.microsoft.com/office/powerpoint/2010/main" val="82998664"/>
+        <p14:creationId xmlns:p14="http://schemas.microsoft.com/office/powerpoint/2010/main" val="4048226358"/>
       </p:ext>
     </p:extLst>
   </p:cSld>
@@ -1566,7 +2315,7 @@
           <a:p>
             <a:fld id="{CCF15043-91C0-B948-9306-70C64EA31C4A}" type="datetimeFigureOut">
               <a:rPr lang="en-US" smtClean="0"/>
-              <a:t>7/1/25</a:t>
+              <a:t>7/10/25</a:t>
             </a:fld>
             <a:endParaRPr lang="en-US"/>
           </a:p>
@@ -1841,7 +2590,7 @@
           <a:p>
             <a:fld id="{CCF15043-91C0-B948-9306-70C64EA31C4A}" type="datetimeFigureOut">
               <a:rPr lang="en-US" smtClean="0"/>
-              <a:t>7/1/25</a:t>
+              <a:t>7/10/25</a:t>
             </a:fld>
             <a:endParaRPr lang="en-US"/>
           </a:p>
@@ -2106,7 +2855,7 @@
           <a:p>
             <a:fld id="{CCF15043-91C0-B948-9306-70C64EA31C4A}" type="datetimeFigureOut">
               <a:rPr lang="en-US" smtClean="0"/>
-              <a:t>7/1/25</a:t>
+              <a:t>7/10/25</a:t>
             </a:fld>
             <a:endParaRPr lang="en-US"/>
           </a:p>
@@ -2518,7 +3267,7 @@
           <a:p>
             <a:fld id="{CCF15043-91C0-B948-9306-70C64EA31C4A}" type="datetimeFigureOut">
               <a:rPr lang="en-US" smtClean="0"/>
-              <a:t>7/1/25</a:t>
+              <a:t>7/10/25</a:t>
             </a:fld>
             <a:endParaRPr lang="en-US"/>
           </a:p>
@@ -2659,7 +3408,7 @@
           <a:p>
             <a:fld id="{CCF15043-91C0-B948-9306-70C64EA31C4A}" type="datetimeFigureOut">
               <a:rPr lang="en-US" smtClean="0"/>
-              <a:t>7/1/25</a:t>
+              <a:t>7/10/25</a:t>
             </a:fld>
             <a:endParaRPr lang="en-US"/>
           </a:p>
@@ -2772,7 +3521,7 @@
           <a:p>
             <a:fld id="{CCF15043-91C0-B948-9306-70C64EA31C4A}" type="datetimeFigureOut">
               <a:rPr lang="en-US" smtClean="0"/>
-              <a:t>7/1/25</a:t>
+              <a:t>7/10/25</a:t>
             </a:fld>
             <a:endParaRPr lang="en-US"/>
           </a:p>
@@ -3083,7 +3832,7 @@
           <a:p>
             <a:fld id="{CCF15043-91C0-B948-9306-70C64EA31C4A}" type="datetimeFigureOut">
               <a:rPr lang="en-US" smtClean="0"/>
-              <a:t>7/1/25</a:t>
+              <a:t>7/10/25</a:t>
             </a:fld>
             <a:endParaRPr lang="en-US"/>
           </a:p>
@@ -3157,8 +3906,8 @@
 </file>
 
 <file path=ppt/slideLayouts/slideLayout9.xml><?xml version="1.0" encoding="utf-8"?>
-<p:sldLayout xmlns:a="http://schemas.openxmlformats.org/drawingml/2006/main" xmlns:r="http://schemas.openxmlformats.org/officeDocument/2006/relationships" xmlns:p="http://schemas.openxmlformats.org/presentationml/2006/main" type="picTx" preserve="1">
-  <p:cSld name="Picture with Caption">
+<p:sldLayout xmlns:a="http://schemas.openxmlformats.org/drawingml/2006/main" xmlns:r="http://schemas.openxmlformats.org/officeDocument/2006/relationships" xmlns:p="http://schemas.openxmlformats.org/presentationml/2006/main" preserve="1" userDrawn="1">
+  <p:cSld name="Custom Layout">
     <p:spTree>
       <p:nvGrpSpPr>
         <p:cNvPr id="1" name=""/>
@@ -3178,7 +3927,7 @@
           <p:cNvPr id="2" name="Title 1">
             <a:extLst>
               <a:ext uri="{FF2B5EF4-FFF2-40B4-BE49-F238E27FC236}">
-                <a16:creationId xmlns:a16="http://schemas.microsoft.com/office/drawing/2014/main" id="{62A98988-506A-C699-C5F6-15E939806A7A}"/>
+                <a16:creationId xmlns:a16="http://schemas.microsoft.com/office/drawing/2014/main" id="{89AD042D-272F-FF5C-EACB-9836247866B4}"/>
               </a:ext>
             </a:extLst>
           </p:cNvPr>
@@ -3189,19 +3938,10 @@
             <p:ph type="title"/>
           </p:nvPr>
         </p:nvSpPr>
-        <p:spPr>
-          <a:xfrm>
-            <a:off x="839788" y="457200"/>
-            <a:ext cx="3932237" cy="1600200"/>
-          </a:xfrm>
-        </p:spPr>
-        <p:txBody>
-          <a:bodyPr anchor="b"/>
-          <a:lstStyle>
-            <a:lvl1pPr>
-              <a:defRPr sz="3200"/>
-            </a:lvl1pPr>
-          </a:lstStyle>
+        <p:spPr/>
+        <p:txBody>
+          <a:bodyPr/>
+          <a:lstStyle/>
           <a:p>
             <a:r>
               <a:rPr lang="en-US"/>
@@ -3212,148 +3952,10 @@
       </p:sp>
       <p:sp>
         <p:nvSpPr>
-          <p:cNvPr id="3" name="Picture Placeholder 2">
-            <a:extLst>
-              <a:ext uri="{FF2B5EF4-FFF2-40B4-BE49-F238E27FC236}">
-                <a16:creationId xmlns:a16="http://schemas.microsoft.com/office/drawing/2014/main" id="{2059F0CC-95F6-365E-C92D-A1FBA931712B}"/>
-              </a:ext>
-            </a:extLst>
-          </p:cNvPr>
-          <p:cNvSpPr>
-            <a:spLocks noGrp="1"/>
-          </p:cNvSpPr>
-          <p:nvPr>
-            <p:ph type="pic" idx="1"/>
-          </p:nvPr>
-        </p:nvSpPr>
-        <p:spPr>
-          <a:xfrm>
-            <a:off x="5183188" y="987425"/>
-            <a:ext cx="6172200" cy="4873625"/>
-          </a:xfrm>
-        </p:spPr>
-        <p:txBody>
-          <a:bodyPr/>
-          <a:lstStyle>
-            <a:lvl1pPr marL="0" indent="0">
-              <a:buNone/>
-              <a:defRPr sz="3200"/>
-            </a:lvl1pPr>
-            <a:lvl2pPr marL="457200" indent="0">
-              <a:buNone/>
-              <a:defRPr sz="2800"/>
-            </a:lvl2pPr>
-            <a:lvl3pPr marL="914400" indent="0">
-              <a:buNone/>
-              <a:defRPr sz="2400"/>
-            </a:lvl3pPr>
-            <a:lvl4pPr marL="1371600" indent="0">
-              <a:buNone/>
-              <a:defRPr sz="2000"/>
-            </a:lvl4pPr>
-            <a:lvl5pPr marL="1828800" indent="0">
-              <a:buNone/>
-              <a:defRPr sz="2000"/>
-            </a:lvl5pPr>
-            <a:lvl6pPr marL="2286000" indent="0">
-              <a:buNone/>
-              <a:defRPr sz="2000"/>
-            </a:lvl6pPr>
-            <a:lvl7pPr marL="2743200" indent="0">
-              <a:buNone/>
-              <a:defRPr sz="2000"/>
-            </a:lvl7pPr>
-            <a:lvl8pPr marL="3200400" indent="0">
-              <a:buNone/>
-              <a:defRPr sz="2000"/>
-            </a:lvl8pPr>
-            <a:lvl9pPr marL="3657600" indent="0">
-              <a:buNone/>
-              <a:defRPr sz="2000"/>
-            </a:lvl9pPr>
-          </a:lstStyle>
-          <a:p>
-            <a:endParaRPr lang="en-US"/>
-          </a:p>
-        </p:txBody>
-      </p:sp>
-      <p:sp>
-        <p:nvSpPr>
-          <p:cNvPr id="4" name="Text Placeholder 3">
-            <a:extLst>
-              <a:ext uri="{FF2B5EF4-FFF2-40B4-BE49-F238E27FC236}">
-                <a16:creationId xmlns:a16="http://schemas.microsoft.com/office/drawing/2014/main" id="{0EA54852-7DCB-EF91-53B4-5B4ACF36C7CF}"/>
-              </a:ext>
-            </a:extLst>
-          </p:cNvPr>
-          <p:cNvSpPr>
-            <a:spLocks noGrp="1"/>
-          </p:cNvSpPr>
-          <p:nvPr>
-            <p:ph type="body" sz="half" idx="2"/>
-          </p:nvPr>
-        </p:nvSpPr>
-        <p:spPr>
-          <a:xfrm>
-            <a:off x="839788" y="2057400"/>
-            <a:ext cx="3932237" cy="3811588"/>
-          </a:xfrm>
-        </p:spPr>
-        <p:txBody>
-          <a:bodyPr/>
-          <a:lstStyle>
-            <a:lvl1pPr marL="0" indent="0">
-              <a:buNone/>
-              <a:defRPr sz="1600"/>
-            </a:lvl1pPr>
-            <a:lvl2pPr marL="457200" indent="0">
-              <a:buNone/>
-              <a:defRPr sz="1400"/>
-            </a:lvl2pPr>
-            <a:lvl3pPr marL="914400" indent="0">
-              <a:buNone/>
-              <a:defRPr sz="1200"/>
-            </a:lvl3pPr>
-            <a:lvl4pPr marL="1371600" indent="0">
-              <a:buNone/>
-              <a:defRPr sz="1000"/>
-            </a:lvl4pPr>
-            <a:lvl5pPr marL="1828800" indent="0">
-              <a:buNone/>
-              <a:defRPr sz="1000"/>
-            </a:lvl5pPr>
-            <a:lvl6pPr marL="2286000" indent="0">
-              <a:buNone/>
-              <a:defRPr sz="1000"/>
-            </a:lvl6pPr>
-            <a:lvl7pPr marL="2743200" indent="0">
-              <a:buNone/>
-              <a:defRPr sz="1000"/>
-            </a:lvl7pPr>
-            <a:lvl8pPr marL="3200400" indent="0">
-              <a:buNone/>
-              <a:defRPr sz="1000"/>
-            </a:lvl8pPr>
-            <a:lvl9pPr marL="3657600" indent="0">
-              <a:buNone/>
-              <a:defRPr sz="1000"/>
-            </a:lvl9pPr>
-          </a:lstStyle>
-          <a:p>
-            <a:pPr lvl="0"/>
-            <a:r>
-              <a:rPr lang="en-US"/>
-              <a:t>Click to edit Master text styles</a:t>
-            </a:r>
-          </a:p>
-        </p:txBody>
-      </p:sp>
-      <p:sp>
-        <p:nvSpPr>
-          <p:cNvPr id="5" name="Date Placeholder 4">
-            <a:extLst>
-              <a:ext uri="{FF2B5EF4-FFF2-40B4-BE49-F238E27FC236}">
-                <a16:creationId xmlns:a16="http://schemas.microsoft.com/office/drawing/2014/main" id="{8FABC63B-1A8E-89E0-78BF-991CB84D435F}"/>
+          <p:cNvPr id="3" name="Date Placeholder 2">
+            <a:extLst>
+              <a:ext uri="{FF2B5EF4-FFF2-40B4-BE49-F238E27FC236}">
+                <a16:creationId xmlns:a16="http://schemas.microsoft.com/office/drawing/2014/main" id="{64E4DA86-AE46-8AF9-A4EE-C72DE8507725}"/>
               </a:ext>
             </a:extLst>
           </p:cNvPr>
@@ -3371,7 +3973,7 @@
           <a:p>
             <a:fld id="{CCF15043-91C0-B948-9306-70C64EA31C4A}" type="datetimeFigureOut">
               <a:rPr lang="en-US" smtClean="0"/>
-              <a:t>7/1/25</a:t>
+              <a:t>7/10/25</a:t>
             </a:fld>
             <a:endParaRPr lang="en-US"/>
           </a:p>
@@ -3379,10 +3981,10 @@
       </p:sp>
       <p:sp>
         <p:nvSpPr>
-          <p:cNvPr id="6" name="Footer Placeholder 5">
-            <a:extLst>
-              <a:ext uri="{FF2B5EF4-FFF2-40B4-BE49-F238E27FC236}">
-                <a16:creationId xmlns:a16="http://schemas.microsoft.com/office/drawing/2014/main" id="{759565FB-6D53-BEBF-128E-3309E51951CC}"/>
+          <p:cNvPr id="4" name="Footer Placeholder 3">
+            <a:extLst>
+              <a:ext uri="{FF2B5EF4-FFF2-40B4-BE49-F238E27FC236}">
+                <a16:creationId xmlns:a16="http://schemas.microsoft.com/office/drawing/2014/main" id="{A05E077F-14E1-E88B-5F7B-52C9A20A4ABE}"/>
               </a:ext>
             </a:extLst>
           </p:cNvPr>
@@ -3404,10 +4006,10 @@
       </p:sp>
       <p:sp>
         <p:nvSpPr>
-          <p:cNvPr id="7" name="Slide Number Placeholder 6">
-            <a:extLst>
-              <a:ext uri="{FF2B5EF4-FFF2-40B4-BE49-F238E27FC236}">
-                <a16:creationId xmlns:a16="http://schemas.microsoft.com/office/drawing/2014/main" id="{625214A9-5A94-356E-4AF4-EEC86C9A563E}"/>
+          <p:cNvPr id="5" name="Slide Number Placeholder 4">
+            <a:extLst>
+              <a:ext uri="{FF2B5EF4-FFF2-40B4-BE49-F238E27FC236}">
+                <a16:creationId xmlns:a16="http://schemas.microsoft.com/office/drawing/2014/main" id="{FEC4605D-BD6B-DFF1-6155-9C5A3018B65E}"/>
               </a:ext>
             </a:extLst>
           </p:cNvPr>
@@ -3434,7 +4036,7 @@
     </p:spTree>
     <p:extLst>
       <p:ext uri="{BB962C8B-B14F-4D97-AF65-F5344CB8AC3E}">
-        <p14:creationId xmlns:p14="http://schemas.microsoft.com/office/powerpoint/2010/main" val="4173356564"/>
+        <p14:creationId xmlns:p14="http://schemas.microsoft.com/office/powerpoint/2010/main" val="159928912"/>
       </p:ext>
     </p:extLst>
   </p:cSld>
@@ -3537,35 +4139,35 @@
           <a:p>
             <a:pPr lvl="0"/>
             <a:r>
-              <a:rPr lang="en-US"/>
+              <a:rPr lang="en-US" dirty="0"/>
               <a:t>Click to edit Master text styles</a:t>
             </a:r>
           </a:p>
           <a:p>
             <a:pPr lvl="1"/>
             <a:r>
-              <a:rPr lang="en-US"/>
+              <a:rPr lang="en-US" dirty="0"/>
               <a:t>Second level</a:t>
             </a:r>
           </a:p>
           <a:p>
             <a:pPr lvl="2"/>
             <a:r>
-              <a:rPr lang="en-US"/>
+              <a:rPr lang="en-US" dirty="0"/>
               <a:t>Third level</a:t>
             </a:r>
           </a:p>
           <a:p>
             <a:pPr lvl="3"/>
             <a:r>
-              <a:rPr lang="en-US"/>
+              <a:rPr lang="en-US" dirty="0"/>
               <a:t>Fourth level</a:t>
             </a:r>
           </a:p>
           <a:p>
             <a:pPr lvl="4"/>
             <a:r>
-              <a:rPr lang="en-US"/>
+              <a:rPr lang="en-US" dirty="0"/>
               <a:t>Fifth level</a:t>
             </a:r>
           </a:p>
@@ -3612,7 +4214,7 @@
           <a:p>
             <a:fld id="{CCF15043-91C0-B948-9306-70C64EA31C4A}" type="datetimeFigureOut">
               <a:rPr lang="en-US" smtClean="0"/>
-              <a:t>7/1/25</a:t>
+              <a:t>7/10/25</a:t>
             </a:fld>
             <a:endParaRPr lang="en-US"/>
           </a:p>
@@ -3725,11 +4327,13 @@
     <p:sldLayoutId id="2147483654" r:id="rId6"/>
     <p:sldLayoutId id="2147483655" r:id="rId7"/>
     <p:sldLayoutId id="2147483656" r:id="rId8"/>
-    <p:sldLayoutId id="2147483657" r:id="rId9"/>
-    <p:sldLayoutId id="2147483658" r:id="rId10"/>
-    <p:sldLayoutId id="2147483659" r:id="rId11"/>
-    <p:sldLayoutId id="2147483660" r:id="rId12"/>
-    <p:sldLayoutId id="2147483661" r:id="rId13"/>
+    <p:sldLayoutId id="2147483662" r:id="rId9"/>
+    <p:sldLayoutId id="2147483657" r:id="rId10"/>
+    <p:sldLayoutId id="2147483658" r:id="rId11"/>
+    <p:sldLayoutId id="2147483666" r:id="rId12"/>
+    <p:sldLayoutId id="2147483667" r:id="rId13"/>
+    <p:sldLayoutId id="2147483665" r:id="rId14"/>
+    <p:sldLayoutId id="2147483664" r:id="rId15"/>
   </p:sldLayoutIdLst>
   <p:txStyles>
     <p:titleStyle>
@@ -4012,56 +4616,6 @@
     </p:otherStyle>
   </p:txStyles>
 </p:sldMaster>
-</file>
-
-<file path=ppt/slides/slide1.xml><?xml version="1.0" encoding="utf-8"?>
-<p:sld xmlns:a="http://schemas.openxmlformats.org/drawingml/2006/main" xmlns:r="http://schemas.openxmlformats.org/officeDocument/2006/relationships" xmlns:p="http://schemas.openxmlformats.org/presentationml/2006/main">
-  <p:cSld>
-    <p:spTree>
-      <p:nvGrpSpPr>
-        <p:cNvPr id="1" name="Shape 161"/>
-        <p:cNvGrpSpPr/>
-        <p:nvPr/>
-      </p:nvGrpSpPr>
-      <p:grpSpPr>
-        <a:xfrm>
-          <a:off x="0" y="0"/>
-          <a:ext cx="0" cy="0"/>
-          <a:chOff x="0" y="0"/>
-          <a:chExt cx="0" cy="0"/>
-        </a:xfrm>
-      </p:grpSpPr>
-    </p:spTree>
-  </p:cSld>
-  <p:clrMapOvr>
-    <a:masterClrMapping/>
-  </p:clrMapOvr>
-</p:sld>
-</file>
-
-<file path=ppt/slides/slide2.xml><?xml version="1.0" encoding="utf-8"?>
-<p:sld xmlns:a="http://schemas.openxmlformats.org/drawingml/2006/main" xmlns:r="http://schemas.openxmlformats.org/officeDocument/2006/relationships" xmlns:p="http://schemas.openxmlformats.org/presentationml/2006/main">
-  <p:cSld>
-    <p:spTree>
-      <p:nvGrpSpPr>
-        <p:cNvPr id="1" name="Shape 168"/>
-        <p:cNvGrpSpPr/>
-        <p:nvPr/>
-      </p:nvGrpSpPr>
-      <p:grpSpPr>
-        <a:xfrm>
-          <a:off x="0" y="0"/>
-          <a:ext cx="0" cy="0"/>
-          <a:chOff x="0" y="0"/>
-          <a:chExt cx="0" cy="0"/>
-        </a:xfrm>
-      </p:grpSpPr>
-    </p:spTree>
-  </p:cSld>
-  <p:clrMapOvr>
-    <a:masterClrMapping/>
-  </p:clrMapOvr>
-</p:sld>
 </file>
 
 <file path=ppt/theme/theme1.xml><?xml version="1.0" encoding="utf-8"?>

</xml_diff>

<commit_message>
Reformatted category_slide.py, added header bars
</commit_message>
<xml_diff>
--- a/templates/sil_combined_template.pptx
+++ b/templates/sil_combined_template.pptx
@@ -1285,156 +1285,19 @@
       </p:grpSpPr>
       <p:sp>
         <p:nvSpPr>
-          <p:cNvPr id="2" name="Rectangle 1">
-            <a:extLst>
-              <a:ext uri="{FF2B5EF4-FFF2-40B4-BE49-F238E27FC236}">
-                <a16:creationId xmlns:a16="http://schemas.microsoft.com/office/drawing/2014/main" id="{5BBE4975-074B-3975-2840-F1379247722D}"/>
-              </a:ext>
-            </a:extLst>
-          </p:cNvPr>
-          <p:cNvSpPr/>
+          <p:cNvPr id="5" name="TextBox 4">
+            <a:extLst>
+              <a:ext uri="{FF2B5EF4-FFF2-40B4-BE49-F238E27FC236}">
+                <a16:creationId xmlns:a16="http://schemas.microsoft.com/office/drawing/2014/main" id="{7DA79522-4CBE-A213-66CA-586D715B2B07}"/>
+              </a:ext>
+            </a:extLst>
+          </p:cNvPr>
+          <p:cNvSpPr txBox="1"/>
           <p:nvPr userDrawn="1"/>
         </p:nvSpPr>
         <p:spPr>
           <a:xfrm>
-            <a:off x="-35560" y="-16476"/>
-            <a:ext cx="12263120" cy="457200"/>
-          </a:xfrm>
-          <a:prstGeom prst="rect">
-            <a:avLst/>
-          </a:prstGeom>
-          <a:solidFill>
-            <a:srgbClr val="DBDBDB"/>
-          </a:solidFill>
-          <a:ln w="38100" cap="sq" cmpd="sng">
-            <a:solidFill>
-              <a:srgbClr val="DBDBDB"/>
-            </a:solidFill>
-            <a:prstDash val="sysDot"/>
-            <a:miter lim="800000"/>
-          </a:ln>
-        </p:spPr>
-        <p:style>
-          <a:lnRef idx="1">
-            <a:schemeClr val="accent1"/>
-          </a:lnRef>
-          <a:fillRef idx="3">
-            <a:schemeClr val="accent1"/>
-          </a:fillRef>
-          <a:effectRef idx="2">
-            <a:schemeClr val="accent1"/>
-          </a:effectRef>
-          <a:fontRef idx="minor">
-            <a:schemeClr val="lt1"/>
-          </a:fontRef>
-        </p:style>
-        <p:txBody>
-          <a:bodyPr rtlCol="0" anchor="ctr"/>
-          <a:lstStyle/>
-          <a:p>
-            <a:pPr algn="ctr"/>
-            <a:endParaRPr/>
-          </a:p>
-        </p:txBody>
-      </p:sp>
-      <p:sp>
-        <p:nvSpPr>
-          <p:cNvPr id="3" name="TextBox 2">
-            <a:extLst>
-              <a:ext uri="{FF2B5EF4-FFF2-40B4-BE49-F238E27FC236}">
-                <a16:creationId xmlns:a16="http://schemas.microsoft.com/office/drawing/2014/main" id="{3EF14B51-AA0C-2062-60F3-562269E8C792}"/>
-              </a:ext>
-            </a:extLst>
-          </p:cNvPr>
-          <p:cNvSpPr txBox="1"/>
-          <p:nvPr userDrawn="1"/>
-        </p:nvSpPr>
-        <p:spPr>
-          <a:xfrm>
-            <a:off x="183184" y="59576"/>
-            <a:ext cx="3973179" cy="338554"/>
-          </a:xfrm>
-          <a:prstGeom prst="rect">
-            <a:avLst/>
-          </a:prstGeom>
-          <a:noFill/>
-        </p:spPr>
-        <p:txBody>
-          <a:bodyPr wrap="square" anchor="ctr">
-            <a:spAutoFit/>
-          </a:bodyPr>
-          <a:lstStyle/>
-          <a:p>
-            <a:pPr>
-              <a:defRPr sz="1400" b="1">
-                <a:latin typeface="Red Hat Display Black"/>
-              </a:defRPr>
-            </a:pPr>
-            <a:r>
-              <a:rPr lang="en-US" sz="1600" dirty="0"/>
-              <a:t>Sponsorship Insights Report</a:t>
-            </a:r>
-            <a:endParaRPr sz="1600" dirty="0"/>
-          </a:p>
-        </p:txBody>
-      </p:sp>
-      <p:sp>
-        <p:nvSpPr>
-          <p:cNvPr id="4" name="TextBox 3">
-            <a:extLst>
-              <a:ext uri="{FF2B5EF4-FFF2-40B4-BE49-F238E27FC236}">
-                <a16:creationId xmlns:a16="http://schemas.microsoft.com/office/drawing/2014/main" id="{1FD8149D-9105-03BD-F818-1AA583A57A43}"/>
-              </a:ext>
-            </a:extLst>
-          </p:cNvPr>
-          <p:cNvSpPr txBox="1"/>
-          <p:nvPr userDrawn="1"/>
-        </p:nvSpPr>
-        <p:spPr>
-          <a:xfrm>
-            <a:off x="5266944" y="121130"/>
-            <a:ext cx="6741872" cy="246221"/>
-          </a:xfrm>
-          <a:prstGeom prst="rect">
-            <a:avLst/>
-          </a:prstGeom>
-          <a:noFill/>
-        </p:spPr>
-        <p:txBody>
-          <a:bodyPr wrap="square" anchor="ctr">
-            <a:spAutoFit/>
-          </a:bodyPr>
-          <a:lstStyle/>
-          <a:p>
-            <a:pPr algn="r">
-              <a:defRPr sz="1400">
-                <a:latin typeface="Red Hat Display Medium"/>
-              </a:defRPr>
-            </a:pPr>
-            <a:r>
-              <a:rPr lang="en-US" sz="1000" b="1" spc="200" dirty="0">
-                <a:latin typeface="Overpass Black" pitchFamily="2" charset="77"/>
-              </a:rPr>
-              <a:t>HOW TO USE THIS REPORT</a:t>
-            </a:r>
-          </a:p>
-        </p:txBody>
-      </p:sp>
-      <p:sp>
-        <p:nvSpPr>
-          <p:cNvPr id="5" name="TextBox 4">
-            <a:extLst>
-              <a:ext uri="{FF2B5EF4-FFF2-40B4-BE49-F238E27FC236}">
-                <a16:creationId xmlns:a16="http://schemas.microsoft.com/office/drawing/2014/main" id="{7DA79522-4CBE-A213-66CA-586D715B2B07}"/>
-              </a:ext>
-            </a:extLst>
-          </p:cNvPr>
-          <p:cNvSpPr txBox="1"/>
-          <p:nvPr userDrawn="1"/>
-        </p:nvSpPr>
-        <p:spPr>
-          <a:xfrm>
-            <a:off x="609216" y="1018593"/>
+            <a:off x="609216" y="1024508"/>
             <a:ext cx="5170411" cy="970074"/>
           </a:xfrm>
           <a:prstGeom prst="rect">
@@ -1454,10 +1317,18 @@
               </a:defRPr>
             </a:pPr>
             <a:r>
-              <a:rPr lang="en-US" sz="3200" dirty="0"/>
+              <a:rPr lang="en-US" sz="3200" i="1" dirty="0">
+                <a:latin typeface="Red Hat Display" panose="02010303040201060303" pitchFamily="2" charset="0"/>
+                <a:ea typeface="Red Hat Display" panose="02010303040201060303" pitchFamily="2" charset="0"/>
+                <a:cs typeface="Red Hat Display" panose="02010303040201060303" pitchFamily="2" charset="0"/>
+              </a:rPr>
               <a:t>How To Use This Report</a:t>
             </a:r>
-            <a:endParaRPr sz="3200" dirty="0"/>
+            <a:endParaRPr sz="3200" i="1" dirty="0">
+              <a:latin typeface="Red Hat Display" panose="02010303040201060303" pitchFamily="2" charset="0"/>
+              <a:ea typeface="Red Hat Display" panose="02010303040201060303" pitchFamily="2" charset="0"/>
+              <a:cs typeface="Red Hat Display" panose="02010303040201060303" pitchFamily="2" charset="0"/>
+            </a:endParaRPr>
           </a:p>
         </p:txBody>
       </p:sp>
@@ -1501,22 +1372,22 @@
               </a:defRPr>
             </a:pPr>
             <a:r>
-              <a:rPr lang="en-US" sz="1400" b="1" dirty="0">
+              <a:rPr lang="en-US" sz="1400" b="1" i="0" dirty="0">
                 <a:latin typeface="Red Hat Display Black" panose="02010303040201060303" pitchFamily="2" charset="0"/>
                 <a:ea typeface="Red Hat Display Black" panose="02010303040201060303" pitchFamily="2" charset="0"/>
                 <a:cs typeface="Red Hat Display Black" panose="02010303040201060303" pitchFamily="2" charset="0"/>
               </a:rPr>
-              <a:t>This report is the definitive playbook for sponsorship strategy—backed by real fan data. </a:t>
-            </a:r>
-            <a:r>
-              <a:rPr lang="en-US" sz="1400" dirty="0">
+              <a:t>This report is the definitive playbook for sponsorship strategy—backed by real fan data</a:t>
+            </a:r>
+            <a:r>
+              <a:rPr lang="en-US" sz="1400" b="0" i="0" dirty="0">
                 <a:latin typeface="Red Hat Display Medium" panose="02010303040201060303" pitchFamily="2" charset="0"/>
                 <a:ea typeface="Red Hat Display Medium" panose="02010303040201060303" pitchFamily="2" charset="0"/>
                 <a:cs typeface="Red Hat Display Medium" panose="02010303040201060303" pitchFamily="2" charset="0"/>
               </a:rPr>
-              <a:t>It reveals exactly who a team’s fans are, from their demographics to the communities they belong to, to the categories and brands they buy. For brands and agencies, it’s the insight you need to decide where to invest. For teams, it’s the proof you need to show why that investment delivers.</a:t>
-            </a:r>
-            <a:endParaRPr sz="1400" dirty="0">
+              <a:t>. It reveals exactly who a team’s fans are, from their demographics to the communities they belong to, to the categories and brands they buy. For brands and agencies, it’s the insight you need to decide where to invest. For teams, it’s the proof you need to show why that investment delivers.</a:t>
+            </a:r>
+            <a:endParaRPr sz="1400" b="0" i="0" dirty="0">
               <a:latin typeface="Red Hat Display Medium" panose="02010303040201060303" pitchFamily="2" charset="0"/>
               <a:ea typeface="Red Hat Display Medium" panose="02010303040201060303" pitchFamily="2" charset="0"/>
               <a:cs typeface="Red Hat Display Medium" panose="02010303040201060303" pitchFamily="2" charset="0"/>
@@ -1800,7 +1671,9 @@
             </a:pPr>
             <a:r>
               <a:rPr lang="en-US" sz="1100" spc="300" dirty="0">
-                <a:latin typeface="Overpass Medium" pitchFamily="2" charset="77"/>
+                <a:latin typeface="Red Hat Display Medium" panose="02010303040201060303" pitchFamily="2" charset="0"/>
+                <a:ea typeface="Red Hat Display Medium" panose="02010303040201060303" pitchFamily="2" charset="0"/>
+                <a:cs typeface="Red Hat Display Medium" panose="02010303040201060303" pitchFamily="2" charset="0"/>
               </a:rPr>
               <a:t>UTILIZE THIS REPORT TO</a:t>
             </a:r>

</xml_diff>

<commit_message>
Made Gina's formatting changes.
</commit_message>
<xml_diff>
--- a/templates/sil_combined_template.pptx
+++ b/templates/sil_combined_template.pptx
@@ -194,7 +194,7 @@
           <a:p>
             <a:fld id="{28781AA5-545A-B34C-92F0-8E176A4C0101}" type="datetimeFigureOut">
               <a:rPr lang="en-US" smtClean="0"/>
-              <a:t>7/13/25</a:t>
+              <a:t>7/16/25</a:t>
             </a:fld>
             <a:endParaRPr lang="en-US"/>
           </a:p>
@@ -608,7 +608,7 @@
           <a:p>
             <a:fld id="{CCF15043-91C0-B948-9306-70C64EA31C4A}" type="datetimeFigureOut">
               <a:rPr lang="en-US" smtClean="0"/>
-              <a:t>7/13/25</a:t>
+              <a:t>7/16/25</a:t>
             </a:fld>
             <a:endParaRPr lang="en-US"/>
           </a:p>
@@ -896,7 +896,7 @@
           <a:p>
             <a:fld id="{CCF15043-91C0-B948-9306-70C64EA31C4A}" type="datetimeFigureOut">
               <a:rPr lang="en-US" smtClean="0"/>
-              <a:t>7/13/25</a:t>
+              <a:t>7/16/25</a:t>
             </a:fld>
             <a:endParaRPr lang="en-US"/>
           </a:p>
@@ -1094,7 +1094,7 @@
           <a:p>
             <a:fld id="{CCF15043-91C0-B948-9306-70C64EA31C4A}" type="datetimeFigureOut">
               <a:rPr lang="en-US" smtClean="0"/>
-              <a:t>7/13/25</a:t>
+              <a:t>7/16/25</a:t>
             </a:fld>
             <a:endParaRPr lang="en-US"/>
           </a:p>
@@ -1254,14 +1254,15 @@
 </file>
 
 <file path=ppt/slideLayouts/slideLayout14.xml><?xml version="1.0" encoding="utf-8"?>
-<p:sldLayout xmlns:a="http://schemas.openxmlformats.org/drawingml/2006/main" xmlns:r="http://schemas.openxmlformats.org/officeDocument/2006/relationships" xmlns:p="http://schemas.openxmlformats.org/presentationml/2006/main" matchingName="Left Title/Body + Right Supporting Image" preserve="1" userDrawn="1">
-  <p:cSld name="1_Left Title/Body + Right Supporting Image">
+<p:sldLayout xmlns:a="http://schemas.openxmlformats.org/drawingml/2006/main" xmlns:r="http://schemas.openxmlformats.org/officeDocument/2006/relationships" xmlns:p="http://schemas.openxmlformats.org/presentationml/2006/main" preserve="1" userDrawn="1">
+  <p:cSld name="1_Custom Layout">
     <p:bg>
       <p:bgPr>
-        <a:blipFill>
+        <a:blipFill dpi="0" rotWithShape="1">
           <a:blip r:embed="rId2">
-            <a:alphaModFix/>
+            <a:lum/>
           </a:blip>
+          <a:srcRect/>
           <a:stretch>
             <a:fillRect/>
           </a:stretch>
@@ -1271,7 +1272,7 @@
     </p:bg>
     <p:spTree>
       <p:nvGrpSpPr>
-        <p:cNvPr id="1" name="Shape 13"/>
+        <p:cNvPr id="1" name=""/>
         <p:cNvGrpSpPr/>
         <p:nvPr/>
       </p:nvGrpSpPr>
@@ -1285,10 +1286,10 @@
       </p:grpSpPr>
       <p:sp>
         <p:nvSpPr>
-          <p:cNvPr id="5" name="TextBox 4">
-            <a:extLst>
-              <a:ext uri="{FF2B5EF4-FFF2-40B4-BE49-F238E27FC236}">
-                <a16:creationId xmlns:a16="http://schemas.microsoft.com/office/drawing/2014/main" id="{7DA79522-4CBE-A213-66CA-586D715B2B07}"/>
+          <p:cNvPr id="15" name="TextBox 14">
+            <a:extLst>
+              <a:ext uri="{FF2B5EF4-FFF2-40B4-BE49-F238E27FC236}">
+                <a16:creationId xmlns:a16="http://schemas.microsoft.com/office/drawing/2014/main" id="{5E164F4C-092B-9B05-7A57-AE575EA6388E}"/>
               </a:ext>
             </a:extLst>
           </p:cNvPr>
@@ -1317,27 +1318,27 @@
               </a:defRPr>
             </a:pPr>
             <a:r>
-              <a:rPr lang="en-US" sz="3200" i="1" dirty="0">
-                <a:latin typeface="Red Hat Display" panose="02010303040201060303" pitchFamily="2" charset="0"/>
-                <a:ea typeface="Red Hat Display" panose="02010303040201060303" pitchFamily="2" charset="0"/>
-                <a:cs typeface="Red Hat Display" panose="02010303040201060303" pitchFamily="2" charset="0"/>
+              <a:rPr lang="en-US" sz="3000" b="0" i="1" dirty="0">
+                <a:latin typeface="Red Hat Display Medium" panose="02010303040201060303" pitchFamily="2" charset="0"/>
+                <a:ea typeface="Red Hat Display Medium" panose="02010303040201060303" pitchFamily="2" charset="0"/>
+                <a:cs typeface="Red Hat Display Medium" panose="02010303040201060303" pitchFamily="2" charset="0"/>
               </a:rPr>
               <a:t>How To Use This Report</a:t>
             </a:r>
-            <a:endParaRPr sz="3200" i="1" dirty="0">
-              <a:latin typeface="Red Hat Display" panose="02010303040201060303" pitchFamily="2" charset="0"/>
-              <a:ea typeface="Red Hat Display" panose="02010303040201060303" pitchFamily="2" charset="0"/>
-              <a:cs typeface="Red Hat Display" panose="02010303040201060303" pitchFamily="2" charset="0"/>
+            <a:endParaRPr sz="3000" b="0" i="1" dirty="0">
+              <a:latin typeface="Red Hat Display Medium" panose="02010303040201060303" pitchFamily="2" charset="0"/>
+              <a:ea typeface="Red Hat Display Medium" panose="02010303040201060303" pitchFamily="2" charset="0"/>
+              <a:cs typeface="Red Hat Display Medium" panose="02010303040201060303" pitchFamily="2" charset="0"/>
             </a:endParaRPr>
           </a:p>
         </p:txBody>
       </p:sp>
       <p:sp>
         <p:nvSpPr>
-          <p:cNvPr id="6" name="TextBox 5">
-            <a:extLst>
-              <a:ext uri="{FF2B5EF4-FFF2-40B4-BE49-F238E27FC236}">
-                <a16:creationId xmlns:a16="http://schemas.microsoft.com/office/drawing/2014/main" id="{D4E4F46D-65B3-1AB2-12E4-60161D0A3FC5}"/>
+          <p:cNvPr id="16" name="TextBox 15">
+            <a:extLst>
+              <a:ext uri="{FF2B5EF4-FFF2-40B4-BE49-F238E27FC236}">
+                <a16:creationId xmlns:a16="http://schemas.microsoft.com/office/drawing/2014/main" id="{A3B5E902-256E-E775-9B81-72C69F868ED5}"/>
               </a:ext>
             </a:extLst>
           </p:cNvPr>
@@ -1347,7 +1348,7 @@
         <p:spPr>
           <a:xfrm>
             <a:off x="609216" y="1827967"/>
-            <a:ext cx="10363584" cy="738664"/>
+            <a:ext cx="10363584" cy="954107"/>
           </a:xfrm>
           <a:prstGeom prst="rect">
             <a:avLst/>
@@ -1373,9 +1374,9 @@
             </a:pPr>
             <a:r>
               <a:rPr lang="en-US" sz="1400" b="1" i="0" dirty="0">
-                <a:latin typeface="Red Hat Display Black" panose="02010303040201060303" pitchFamily="2" charset="0"/>
-                <a:ea typeface="Red Hat Display Black" panose="02010303040201060303" pitchFamily="2" charset="0"/>
-                <a:cs typeface="Red Hat Display Black" panose="02010303040201060303" pitchFamily="2" charset="0"/>
+                <a:latin typeface="Red Hat Display Medium" panose="02010303040201060303" pitchFamily="2" charset="0"/>
+                <a:ea typeface="Red Hat Display Medium" panose="02010303040201060303" pitchFamily="2" charset="0"/>
+                <a:cs typeface="Red Hat Display Medium" panose="02010303040201060303" pitchFamily="2" charset="0"/>
               </a:rPr>
               <a:t>This report is the definitive playbook for sponsorship strategy—backed by real fan data</a:t>
             </a:r>
@@ -1397,10 +1398,10 @@
       </p:sp>
       <p:sp>
         <p:nvSpPr>
-          <p:cNvPr id="7" name="TextBox 6">
-            <a:extLst>
-              <a:ext uri="{FF2B5EF4-FFF2-40B4-BE49-F238E27FC236}">
-                <a16:creationId xmlns:a16="http://schemas.microsoft.com/office/drawing/2014/main" id="{92C2417E-7537-FE8C-880C-891BD10B4A94}"/>
+          <p:cNvPr id="17" name="TextBox 16">
+            <a:extLst>
+              <a:ext uri="{FF2B5EF4-FFF2-40B4-BE49-F238E27FC236}">
+                <a16:creationId xmlns:a16="http://schemas.microsoft.com/office/drawing/2014/main" id="{6D9F9E79-4DD9-5561-1D5C-4EA3313ECEC2}"/>
               </a:ext>
             </a:extLst>
           </p:cNvPr>
@@ -1425,52 +1426,39 @@
           <a:p>
             <a:pPr algn="ctr"/>
             <a:r>
-              <a:rPr lang="en-US" sz="1200" b="1" i="0" u="none" strike="noStrike" dirty="0">
-                <a:solidFill>
-                  <a:srgbClr val="000000"/>
-                </a:solidFill>
-                <a:effectLst/>
-                <a:latin typeface="Red Hat Display Black" panose="02010303040201060303" pitchFamily="2" charset="0"/>
-                <a:ea typeface="Red Hat Display Black" panose="02010303040201060303" pitchFamily="2" charset="0"/>
-                <a:cs typeface="Red Hat Display Black" panose="02010303040201060303" pitchFamily="2" charset="0"/>
+              <a:rPr lang="en-US" sz="1200" b="1" i="0" dirty="0">
+                <a:latin typeface="Red Hat Display Medium" panose="02010303040201060303" pitchFamily="2" charset="0"/>
+                <a:ea typeface="Red Hat Display Medium" panose="02010303040201060303" pitchFamily="2" charset="0"/>
+                <a:cs typeface="Red Hat Display Medium" panose="02010303040201060303" pitchFamily="2" charset="0"/>
               </a:rPr>
               <a:t>Pinpoint the Highest-Value Sponsorship Opportunities</a:t>
             </a:r>
           </a:p>
           <a:p>
             <a:br>
-              <a:rPr lang="en-US" sz="1200" dirty="0">
+              <a:rPr lang="en-US" sz="1200" b="0" i="0" dirty="0">
                 <a:latin typeface="Red Hat Display Medium" panose="02010303040201060303" pitchFamily="2" charset="0"/>
                 <a:ea typeface="Red Hat Display Medium" panose="02010303040201060303" pitchFamily="2" charset="0"/>
                 <a:cs typeface="Red Hat Display Medium" panose="02010303040201060303" pitchFamily="2" charset="0"/>
               </a:rPr>
             </a:br>
             <a:r>
-              <a:rPr lang="en-US" sz="1200" b="0" i="0" u="none" strike="noStrike" dirty="0">
-                <a:solidFill>
-                  <a:srgbClr val="000000"/>
-                </a:solidFill>
-                <a:effectLst/>
+              <a:rPr lang="en-US" sz="1200" b="0" i="0" dirty="0">
                 <a:latin typeface="Red Hat Display Medium" panose="02010303040201060303" pitchFamily="2" charset="0"/>
                 <a:ea typeface="Red Hat Display Medium" panose="02010303040201060303" pitchFamily="2" charset="0"/>
                 <a:cs typeface="Red Hat Display Medium" panose="02010303040201060303" pitchFamily="2" charset="0"/>
               </a:rPr>
               <a:t>Identify the categories where your fans over-index in actual spending. This report highlights the brand verticals most aligned with your fan base, allowing teams to prioritize outreach and focus sales efforts—and enabling brands to target where the return is highest.</a:t>
             </a:r>
-            <a:endParaRPr lang="en-US" sz="1200" dirty="0">
-              <a:latin typeface="Red Hat Display Medium" panose="02010303040201060303" pitchFamily="2" charset="0"/>
-              <a:ea typeface="Red Hat Display Medium" panose="02010303040201060303" pitchFamily="2" charset="0"/>
-              <a:cs typeface="Red Hat Display Medium" panose="02010303040201060303" pitchFamily="2" charset="0"/>
-            </a:endParaRPr>
-          </a:p>
-        </p:txBody>
-      </p:sp>
-      <p:sp>
-        <p:nvSpPr>
-          <p:cNvPr id="8" name="TextBox 7">
-            <a:extLst>
-              <a:ext uri="{FF2B5EF4-FFF2-40B4-BE49-F238E27FC236}">
-                <a16:creationId xmlns:a16="http://schemas.microsoft.com/office/drawing/2014/main" id="{4A654AB0-8ADD-6EF3-6ECB-1B70A4129B39}"/>
+          </a:p>
+        </p:txBody>
+      </p:sp>
+      <p:sp>
+        <p:nvSpPr>
+          <p:cNvPr id="18" name="TextBox 17">
+            <a:extLst>
+              <a:ext uri="{FF2B5EF4-FFF2-40B4-BE49-F238E27FC236}">
+                <a16:creationId xmlns:a16="http://schemas.microsoft.com/office/drawing/2014/main" id="{605C9562-2E5D-E927-582E-9D3BBEE0C50F}"/>
               </a:ext>
             </a:extLst>
           </p:cNvPr>
@@ -1495,24 +1483,24 @@
           <a:p>
             <a:pPr algn="ctr"/>
             <a:r>
-              <a:rPr lang="en-US" sz="1200" b="1" dirty="0">
-                <a:latin typeface="Red Hat Display Black" panose="02010303040201060303" pitchFamily="2" charset="0"/>
-                <a:ea typeface="Red Hat Display Black" panose="02010303040201060303" pitchFamily="2" charset="0"/>
-                <a:cs typeface="Red Hat Display Black" panose="02010303040201060303" pitchFamily="2" charset="0"/>
+              <a:rPr lang="en-US" sz="1200" b="1" i="0" dirty="0">
+                <a:latin typeface="Red Hat Display Medium" panose="02010303040201060303" pitchFamily="2" charset="0"/>
+                <a:ea typeface="Red Hat Display Medium" panose="02010303040201060303" pitchFamily="2" charset="0"/>
+                <a:cs typeface="Red Hat Display Medium" panose="02010303040201060303" pitchFamily="2" charset="0"/>
               </a:rPr>
               <a:t>Build Data-Driven Collateral That Closes</a:t>
             </a:r>
           </a:p>
           <a:p>
             <a:br>
-              <a:rPr lang="en-US" sz="1200" dirty="0">
+              <a:rPr lang="en-US" sz="1200" b="0" i="0" dirty="0">
                 <a:latin typeface="Red Hat Display Medium" panose="02010303040201060303" pitchFamily="2" charset="0"/>
                 <a:ea typeface="Red Hat Display Medium" panose="02010303040201060303" pitchFamily="2" charset="0"/>
                 <a:cs typeface="Red Hat Display Medium" panose="02010303040201060303" pitchFamily="2" charset="0"/>
               </a:rPr>
             </a:br>
             <a:r>
-              <a:rPr lang="en-US" sz="1200" dirty="0">
+              <a:rPr lang="en-US" sz="1200" b="0" i="0" dirty="0">
                 <a:latin typeface="Red Hat Display Medium" panose="02010303040201060303" pitchFamily="2" charset="0"/>
                 <a:ea typeface="Red Hat Display Medium" panose="02010303040201060303" pitchFamily="2" charset="0"/>
                 <a:cs typeface="Red Hat Display Medium" panose="02010303040201060303" pitchFamily="2" charset="0"/>
@@ -1524,10 +1512,10 @@
       </p:sp>
       <p:sp>
         <p:nvSpPr>
-          <p:cNvPr id="9" name="TextBox 8">
-            <a:extLst>
-              <a:ext uri="{FF2B5EF4-FFF2-40B4-BE49-F238E27FC236}">
-                <a16:creationId xmlns:a16="http://schemas.microsoft.com/office/drawing/2014/main" id="{DB82AEB0-9B68-DB17-4FE5-DB6CE7DE42BE}"/>
+          <p:cNvPr id="19" name="TextBox 18">
+            <a:extLst>
+              <a:ext uri="{FF2B5EF4-FFF2-40B4-BE49-F238E27FC236}">
+                <a16:creationId xmlns:a16="http://schemas.microsoft.com/office/drawing/2014/main" id="{49A69193-842B-E7DD-BCB3-FCA66EB20066}"/>
               </a:ext>
             </a:extLst>
           </p:cNvPr>
@@ -1552,24 +1540,24 @@
           <a:p>
             <a:pPr algn="ctr"/>
             <a:r>
-              <a:rPr lang="en-US" sz="1200" b="1" dirty="0">
-                <a:latin typeface="Red Hat Display Black" panose="02010303040201060303" pitchFamily="2" charset="0"/>
-                <a:ea typeface="Red Hat Display Black" panose="02010303040201060303" pitchFamily="2" charset="0"/>
-                <a:cs typeface="Red Hat Display Black" panose="02010303040201060303" pitchFamily="2" charset="0"/>
+              <a:rPr lang="en-US" sz="1200" b="1" i="0" dirty="0">
+                <a:latin typeface="Red Hat Display Medium" panose="02010303040201060303" pitchFamily="2" charset="0"/>
+                <a:ea typeface="Red Hat Display Medium" panose="02010303040201060303" pitchFamily="2" charset="0"/>
+                <a:cs typeface="Red Hat Display Medium" panose="02010303040201060303" pitchFamily="2" charset="0"/>
               </a:rPr>
               <a:t>Prove and Benchmark Sponsorship ROI</a:t>
             </a:r>
           </a:p>
           <a:p>
             <a:br>
-              <a:rPr lang="en-US" sz="1200" dirty="0">
+              <a:rPr lang="en-US" sz="1200" b="0" i="0" dirty="0">
                 <a:latin typeface="Red Hat Display Medium" panose="02010303040201060303" pitchFamily="2" charset="0"/>
                 <a:ea typeface="Red Hat Display Medium" panose="02010303040201060303" pitchFamily="2" charset="0"/>
                 <a:cs typeface="Red Hat Display Medium" panose="02010303040201060303" pitchFamily="2" charset="0"/>
               </a:rPr>
             </a:br>
             <a:r>
-              <a:rPr lang="en-US" sz="1200" dirty="0">
+              <a:rPr lang="en-US" sz="1200" b="0" i="0" dirty="0">
                 <a:latin typeface="Red Hat Display Medium" panose="02010303040201060303" pitchFamily="2" charset="0"/>
                 <a:ea typeface="Red Hat Display Medium" panose="02010303040201060303" pitchFamily="2" charset="0"/>
                 <a:cs typeface="Red Hat Display Medium" panose="02010303040201060303" pitchFamily="2" charset="0"/>
@@ -1581,10 +1569,10 @@
       </p:sp>
       <p:sp>
         <p:nvSpPr>
-          <p:cNvPr id="10" name="TextBox 9">
-            <a:extLst>
-              <a:ext uri="{FF2B5EF4-FFF2-40B4-BE49-F238E27FC236}">
-                <a16:creationId xmlns:a16="http://schemas.microsoft.com/office/drawing/2014/main" id="{2696EC69-8776-6883-9DCB-5CEED6F4FF59}"/>
+          <p:cNvPr id="20" name="TextBox 19">
+            <a:extLst>
+              <a:ext uri="{FF2B5EF4-FFF2-40B4-BE49-F238E27FC236}">
+                <a16:creationId xmlns:a16="http://schemas.microsoft.com/office/drawing/2014/main" id="{070CC667-1240-6117-18AC-A576B6131E7B}"/>
               </a:ext>
             </a:extLst>
           </p:cNvPr>
@@ -1609,24 +1597,24 @@
           <a:p>
             <a:pPr algn="ctr"/>
             <a:r>
-              <a:rPr lang="en-US" sz="1200" b="1" dirty="0">
-                <a:latin typeface="Red Hat Display Black" panose="02010303040201060303" pitchFamily="2" charset="0"/>
-                <a:ea typeface="Red Hat Display Black" panose="02010303040201060303" pitchFamily="2" charset="0"/>
-                <a:cs typeface="Red Hat Display Black" panose="02010303040201060303" pitchFamily="2" charset="0"/>
+              <a:rPr lang="en-US" sz="1200" b="1" i="0" dirty="0">
+                <a:latin typeface="Red Hat Display Medium" panose="02010303040201060303" pitchFamily="2" charset="0"/>
+                <a:ea typeface="Red Hat Display Medium" panose="02010303040201060303" pitchFamily="2" charset="0"/>
+                <a:cs typeface="Red Hat Display Medium" panose="02010303040201060303" pitchFamily="2" charset="0"/>
               </a:rPr>
               <a:t>Validate Brand and Category Alignment</a:t>
             </a:r>
           </a:p>
           <a:p>
             <a:br>
-              <a:rPr lang="en-US" sz="1200" dirty="0">
+              <a:rPr lang="en-US" sz="1200" b="0" i="0" dirty="0">
                 <a:latin typeface="Red Hat Display Medium" panose="02010303040201060303" pitchFamily="2" charset="0"/>
                 <a:ea typeface="Red Hat Display Medium" panose="02010303040201060303" pitchFamily="2" charset="0"/>
                 <a:cs typeface="Red Hat Display Medium" panose="02010303040201060303" pitchFamily="2" charset="0"/>
               </a:rPr>
             </a:br>
             <a:r>
-              <a:rPr lang="en-US" sz="1200" dirty="0">
+              <a:rPr lang="en-US" sz="1200" b="0" i="0" dirty="0">
                 <a:latin typeface="Red Hat Display Medium" panose="02010303040201060303" pitchFamily="2" charset="0"/>
                 <a:ea typeface="Red Hat Display Medium" panose="02010303040201060303" pitchFamily="2" charset="0"/>
                 <a:cs typeface="Red Hat Display Medium" panose="02010303040201060303" pitchFamily="2" charset="0"/>
@@ -1638,10 +1626,10 @@
       </p:sp>
       <p:sp>
         <p:nvSpPr>
-          <p:cNvPr id="11" name="TextBox 10">
-            <a:extLst>
-              <a:ext uri="{FF2B5EF4-FFF2-40B4-BE49-F238E27FC236}">
-                <a16:creationId xmlns:a16="http://schemas.microsoft.com/office/drawing/2014/main" id="{65EA24BA-BEBD-0F90-43FB-FDB30AA87E4A}"/>
+          <p:cNvPr id="21" name="TextBox 20">
+            <a:extLst>
+              <a:ext uri="{FF2B5EF4-FFF2-40B4-BE49-F238E27FC236}">
+                <a16:creationId xmlns:a16="http://schemas.microsoft.com/office/drawing/2014/main" id="{AC5202EC-17C4-E380-16AC-7D5881165593}"/>
               </a:ext>
             </a:extLst>
           </p:cNvPr>
@@ -1650,8 +1638,8 @@
         </p:nvSpPr>
         <p:spPr>
           <a:xfrm>
-            <a:off x="2701147" y="2818028"/>
-            <a:ext cx="6156960" cy="261610"/>
+            <a:off x="2701147" y="2727265"/>
+            <a:ext cx="6156960" cy="307777"/>
           </a:xfrm>
           <a:prstGeom prst="rect">
             <a:avLst/>
@@ -1670,7 +1658,7 @@
               </a:defRPr>
             </a:pPr>
             <a:r>
-              <a:rPr lang="en-US" sz="1100" spc="300" dirty="0">
+              <a:rPr lang="en-US" b="1" i="0" dirty="0">
                 <a:latin typeface="Red Hat Display Medium" panose="02010303040201060303" pitchFamily="2" charset="0"/>
                 <a:ea typeface="Red Hat Display Medium" panose="02010303040201060303" pitchFamily="2" charset="0"/>
                 <a:cs typeface="Red Hat Display Medium" panose="02010303040201060303" pitchFamily="2" charset="0"/>
@@ -1682,10 +1670,10 @@
       </p:sp>
       <p:cxnSp>
         <p:nvCxnSpPr>
-          <p:cNvPr id="12" name="Straight Connector 11">
-            <a:extLst>
-              <a:ext uri="{FF2B5EF4-FFF2-40B4-BE49-F238E27FC236}">
-                <a16:creationId xmlns:a16="http://schemas.microsoft.com/office/drawing/2014/main" id="{1F10F685-A484-B848-2507-981483441E13}"/>
+          <p:cNvPr id="22" name="Straight Connector 21">
+            <a:extLst>
+              <a:ext uri="{FF2B5EF4-FFF2-40B4-BE49-F238E27FC236}">
+                <a16:creationId xmlns:a16="http://schemas.microsoft.com/office/drawing/2014/main" id="{1DB6EA32-35F9-1FF1-4069-C6919202DAFB}"/>
               </a:ext>
             </a:extLst>
           </p:cNvPr>
@@ -1694,7 +1682,7 @@
         </p:nvCxnSpPr>
         <p:spPr>
           <a:xfrm flipH="1">
-            <a:off x="1622721" y="2948833"/>
+            <a:off x="1476947" y="2881153"/>
             <a:ext cx="2692400" cy="0"/>
           </a:xfrm>
           <a:prstGeom prst="line">
@@ -1727,10 +1715,10 @@
       </p:cxnSp>
       <p:cxnSp>
         <p:nvCxnSpPr>
-          <p:cNvPr id="13" name="Straight Connector 12">
-            <a:extLst>
-              <a:ext uri="{FF2B5EF4-FFF2-40B4-BE49-F238E27FC236}">
-                <a16:creationId xmlns:a16="http://schemas.microsoft.com/office/drawing/2014/main" id="{A2E91336-3B3A-5120-43EC-8FEF509F5CF4}"/>
+          <p:cNvPr id="23" name="Straight Connector 22">
+            <a:extLst>
+              <a:ext uri="{FF2B5EF4-FFF2-40B4-BE49-F238E27FC236}">
+                <a16:creationId xmlns:a16="http://schemas.microsoft.com/office/drawing/2014/main" id="{D4FF0BDF-CA91-10DC-8818-510F27C4805D}"/>
               </a:ext>
             </a:extLst>
           </p:cNvPr>
@@ -1739,7 +1727,7 @@
         </p:nvCxnSpPr>
         <p:spPr>
           <a:xfrm flipH="1">
-            <a:off x="7206239" y="2948833"/>
+            <a:off x="7400537" y="2881153"/>
             <a:ext cx="2692400" cy="0"/>
           </a:xfrm>
           <a:prstGeom prst="line">
@@ -1772,10 +1760,10 @@
       </p:cxnSp>
       <p:pic>
         <p:nvPicPr>
-          <p:cNvPr id="14" name="Graphic 13">
-            <a:extLst>
-              <a:ext uri="{FF2B5EF4-FFF2-40B4-BE49-F238E27FC236}">
-                <a16:creationId xmlns:a16="http://schemas.microsoft.com/office/drawing/2014/main" id="{5CF03467-2810-0514-5521-B159CD501ECD}"/>
+          <p:cNvPr id="24" name="Graphic 23">
+            <a:extLst>
+              <a:ext uri="{FF2B5EF4-FFF2-40B4-BE49-F238E27FC236}">
+                <a16:creationId xmlns:a16="http://schemas.microsoft.com/office/drawing/2014/main" id="{C426D9C1-D8F9-B3E1-1A3B-5B6D86A37631}"/>
               </a:ext>
             </a:extLst>
           </p:cNvPr>
@@ -1808,10 +1796,10 @@
       </p:pic>
       <p:pic>
         <p:nvPicPr>
-          <p:cNvPr id="15" name="Graphic 14">
-            <a:extLst>
-              <a:ext uri="{FF2B5EF4-FFF2-40B4-BE49-F238E27FC236}">
-                <a16:creationId xmlns:a16="http://schemas.microsoft.com/office/drawing/2014/main" id="{4FBA535E-0CA4-F781-8AB1-60731FC2EAC5}"/>
+          <p:cNvPr id="25" name="Graphic 24">
+            <a:extLst>
+              <a:ext uri="{FF2B5EF4-FFF2-40B4-BE49-F238E27FC236}">
+                <a16:creationId xmlns:a16="http://schemas.microsoft.com/office/drawing/2014/main" id="{6AB7B033-BEDD-23FE-D2A7-E9707E9FFBFF}"/>
               </a:ext>
             </a:extLst>
           </p:cNvPr>
@@ -1844,10 +1832,10 @@
       </p:pic>
       <p:pic>
         <p:nvPicPr>
-          <p:cNvPr id="16" name="Graphic 15">
-            <a:extLst>
-              <a:ext uri="{FF2B5EF4-FFF2-40B4-BE49-F238E27FC236}">
-                <a16:creationId xmlns:a16="http://schemas.microsoft.com/office/drawing/2014/main" id="{7E163514-89A9-0C0D-6259-684CB18884E0}"/>
+          <p:cNvPr id="26" name="Graphic 25">
+            <a:extLst>
+              <a:ext uri="{FF2B5EF4-FFF2-40B4-BE49-F238E27FC236}">
+                <a16:creationId xmlns:a16="http://schemas.microsoft.com/office/drawing/2014/main" id="{501BF043-69D2-36E1-DAE7-2B94E9C0BB3F}"/>
               </a:ext>
             </a:extLst>
           </p:cNvPr>
@@ -1880,10 +1868,10 @@
       </p:pic>
       <p:pic>
         <p:nvPicPr>
-          <p:cNvPr id="17" name="Graphic 16">
-            <a:extLst>
-              <a:ext uri="{FF2B5EF4-FFF2-40B4-BE49-F238E27FC236}">
-                <a16:creationId xmlns:a16="http://schemas.microsoft.com/office/drawing/2014/main" id="{00A8CE0B-95CE-93D6-56C9-481738D1CC77}"/>
+          <p:cNvPr id="27" name="Graphic 26">
+            <a:extLst>
+              <a:ext uri="{FF2B5EF4-FFF2-40B4-BE49-F238E27FC236}">
+                <a16:creationId xmlns:a16="http://schemas.microsoft.com/office/drawing/2014/main" id="{C1EDF3E5-9E68-06E2-8F77-119FAB1D7F45}"/>
               </a:ext>
             </a:extLst>
           </p:cNvPr>
@@ -1917,7 +1905,7 @@
     </p:spTree>
     <p:extLst>
       <p:ext uri="{BB962C8B-B14F-4D97-AF65-F5344CB8AC3E}">
-        <p14:creationId xmlns:p14="http://schemas.microsoft.com/office/powerpoint/2010/main" val="696694307"/>
+        <p14:creationId xmlns:p14="http://schemas.microsoft.com/office/powerpoint/2010/main" val="2215806445"/>
       </p:ext>
     </p:extLst>
   </p:cSld>
@@ -2022,6 +2010,96 @@
           </a:p>
         </p:txBody>
       </p:sp>
+      <p:sp>
+        <p:nvSpPr>
+          <p:cNvPr id="3" name="TextBox 2">
+            <a:extLst>
+              <a:ext uri="{FF2B5EF4-FFF2-40B4-BE49-F238E27FC236}">
+                <a16:creationId xmlns:a16="http://schemas.microsoft.com/office/drawing/2014/main" id="{05B59D60-B0F3-B6E3-5C62-8ED9EED3488E}"/>
+              </a:ext>
+            </a:extLst>
+          </p:cNvPr>
+          <p:cNvSpPr txBox="1"/>
+          <p:nvPr userDrawn="1"/>
+        </p:nvSpPr>
+        <p:spPr>
+          <a:xfrm>
+            <a:off x="2278695" y="4706554"/>
+            <a:ext cx="7634610" cy="646331"/>
+          </a:xfrm>
+          <a:prstGeom prst="rect">
+            <a:avLst/>
+          </a:prstGeom>
+          <a:noFill/>
+        </p:spPr>
+        <p:txBody>
+          <a:bodyPr wrap="square">
+            <a:spAutoFit/>
+          </a:bodyPr>
+          <a:lstStyle/>
+          <a:p>
+            <a:pPr algn="ctr"/>
+            <a:r>
+              <a:rPr lang="en-US" sz="1800" b="0" i="0" dirty="0">
+                <a:solidFill>
+                  <a:schemeClr val="bg1"/>
+                </a:solidFill>
+                <a:latin typeface="Red Hat Display Medium" panose="02010303040201060303" pitchFamily="2" charset="0"/>
+                <a:ea typeface="Red Hat Display Medium" panose="02010303040201060303" pitchFamily="2" charset="0"/>
+                <a:cs typeface="Red Hat Display Medium" panose="02010303040201060303" pitchFamily="2" charset="0"/>
+              </a:rPr>
+              <a:t>For a custom report or more information about translating your </a:t>
+            </a:r>
+          </a:p>
+          <a:p>
+            <a:pPr algn="ctr"/>
+            <a:r>
+              <a:rPr lang="en-US" sz="1800" b="0" i="1" dirty="0">
+                <a:solidFill>
+                  <a:schemeClr val="bg1"/>
+                </a:solidFill>
+                <a:latin typeface="Red Hat Display Medium" panose="02010303040201060303" pitchFamily="2" charset="0"/>
+                <a:ea typeface="Red Hat Display Medium" panose="02010303040201060303" pitchFamily="2" charset="0"/>
+                <a:cs typeface="Red Hat Display Medium" panose="02010303040201060303" pitchFamily="2" charset="0"/>
+              </a:rPr>
+              <a:t>team insights into activation</a:t>
+            </a:r>
+            <a:r>
+              <a:rPr lang="en-US" sz="1800" b="0" i="0" dirty="0">
+                <a:solidFill>
+                  <a:schemeClr val="bg1"/>
+                </a:solidFill>
+                <a:latin typeface="Red Hat Display Medium" panose="02010303040201060303" pitchFamily="2" charset="0"/>
+                <a:ea typeface="Red Hat Display Medium" panose="02010303040201060303" pitchFamily="2" charset="0"/>
+                <a:cs typeface="Red Hat Display Medium" panose="02010303040201060303" pitchFamily="2" charset="0"/>
+              </a:rPr>
+              <a:t>, send an email to: </a:t>
+            </a:r>
+            <a:r>
+              <a:rPr lang="en-US" sz="1800" b="1" i="0" dirty="0" err="1">
+                <a:solidFill>
+                  <a:schemeClr val="bg1"/>
+                </a:solidFill>
+                <a:latin typeface="Red Hat Display Medium" panose="02010303040201060303" pitchFamily="2" charset="0"/>
+                <a:ea typeface="Red Hat Display Medium" panose="02010303040201060303" pitchFamily="2" charset="0"/>
+                <a:cs typeface="Red Hat Display Medium" panose="02010303040201060303" pitchFamily="2" charset="0"/>
+              </a:rPr>
+              <a:t>insights@sportsilab.com</a:t>
+            </a:r>
+            <a:r>
+              <a:rPr lang="en-US" sz="1800" b="1" i="0" dirty="0">
+                <a:solidFill>
+                  <a:schemeClr val="bg1"/>
+                </a:solidFill>
+                <a:latin typeface="Red Hat Display Medium" panose="02010303040201060303" pitchFamily="2" charset="0"/>
+                <a:ea typeface="Red Hat Display Medium" panose="02010303040201060303" pitchFamily="2" charset="0"/>
+                <a:cs typeface="Red Hat Display Medium" panose="02010303040201060303" pitchFamily="2" charset="0"/>
+              </a:rPr>
+              <a:t>  </a:t>
+            </a:r>
+          </a:p>
+        </p:txBody>
+      </p:sp>
     </p:spTree>
     <p:extLst>
       <p:ext uri="{BB962C8B-B14F-4D97-AF65-F5344CB8AC3E}">
@@ -2160,7 +2238,7 @@
           <a:p>
             <a:fld id="{CCF15043-91C0-B948-9306-70C64EA31C4A}" type="datetimeFigureOut">
               <a:rPr lang="en-US" smtClean="0"/>
-              <a:t>7/13/25</a:t>
+              <a:t>7/16/25</a:t>
             </a:fld>
             <a:endParaRPr lang="en-US"/>
           </a:p>
@@ -2435,7 +2513,7 @@
           <a:p>
             <a:fld id="{CCF15043-91C0-B948-9306-70C64EA31C4A}" type="datetimeFigureOut">
               <a:rPr lang="en-US" smtClean="0"/>
-              <a:t>7/13/25</a:t>
+              <a:t>7/16/25</a:t>
             </a:fld>
             <a:endParaRPr lang="en-US"/>
           </a:p>
@@ -2700,7 +2778,7 @@
           <a:p>
             <a:fld id="{CCF15043-91C0-B948-9306-70C64EA31C4A}" type="datetimeFigureOut">
               <a:rPr lang="en-US" smtClean="0"/>
-              <a:t>7/13/25</a:t>
+              <a:t>7/16/25</a:t>
             </a:fld>
             <a:endParaRPr lang="en-US"/>
           </a:p>
@@ -3112,7 +3190,7 @@
           <a:p>
             <a:fld id="{CCF15043-91C0-B948-9306-70C64EA31C4A}" type="datetimeFigureOut">
               <a:rPr lang="en-US" smtClean="0"/>
-              <a:t>7/13/25</a:t>
+              <a:t>7/16/25</a:t>
             </a:fld>
             <a:endParaRPr lang="en-US"/>
           </a:p>
@@ -3253,7 +3331,7 @@
           <a:p>
             <a:fld id="{CCF15043-91C0-B948-9306-70C64EA31C4A}" type="datetimeFigureOut">
               <a:rPr lang="en-US" smtClean="0"/>
-              <a:t>7/13/25</a:t>
+              <a:t>7/16/25</a:t>
             </a:fld>
             <a:endParaRPr lang="en-US"/>
           </a:p>
@@ -3343,89 +3421,6 @@
           <a:chExt cx="0" cy="0"/>
         </a:xfrm>
       </p:grpSpPr>
-      <p:sp>
-        <p:nvSpPr>
-          <p:cNvPr id="2" name="Date Placeholder 1">
-            <a:extLst>
-              <a:ext uri="{FF2B5EF4-FFF2-40B4-BE49-F238E27FC236}">
-                <a16:creationId xmlns:a16="http://schemas.microsoft.com/office/drawing/2014/main" id="{DCD796DB-E621-858E-E23C-9A0668C49055}"/>
-              </a:ext>
-            </a:extLst>
-          </p:cNvPr>
-          <p:cNvSpPr>
-            <a:spLocks noGrp="1"/>
-          </p:cNvSpPr>
-          <p:nvPr>
-            <p:ph type="dt" sz="half" idx="10"/>
-          </p:nvPr>
-        </p:nvSpPr>
-        <p:spPr/>
-        <p:txBody>
-          <a:bodyPr/>
-          <a:lstStyle/>
-          <a:p>
-            <a:fld id="{CCF15043-91C0-B948-9306-70C64EA31C4A}" type="datetimeFigureOut">
-              <a:rPr lang="en-US" smtClean="0"/>
-              <a:t>7/13/25</a:t>
-            </a:fld>
-            <a:endParaRPr lang="en-US"/>
-          </a:p>
-        </p:txBody>
-      </p:sp>
-      <p:sp>
-        <p:nvSpPr>
-          <p:cNvPr id="3" name="Footer Placeholder 2">
-            <a:extLst>
-              <a:ext uri="{FF2B5EF4-FFF2-40B4-BE49-F238E27FC236}">
-                <a16:creationId xmlns:a16="http://schemas.microsoft.com/office/drawing/2014/main" id="{1D42C0F7-7B1D-C098-A191-0B1976B83D75}"/>
-              </a:ext>
-            </a:extLst>
-          </p:cNvPr>
-          <p:cNvSpPr>
-            <a:spLocks noGrp="1"/>
-          </p:cNvSpPr>
-          <p:nvPr>
-            <p:ph type="ftr" sz="quarter" idx="11"/>
-          </p:nvPr>
-        </p:nvSpPr>
-        <p:spPr/>
-        <p:txBody>
-          <a:bodyPr/>
-          <a:lstStyle/>
-          <a:p>
-            <a:endParaRPr lang="en-US"/>
-          </a:p>
-        </p:txBody>
-      </p:sp>
-      <p:sp>
-        <p:nvSpPr>
-          <p:cNvPr id="4" name="Slide Number Placeholder 3">
-            <a:extLst>
-              <a:ext uri="{FF2B5EF4-FFF2-40B4-BE49-F238E27FC236}">
-                <a16:creationId xmlns:a16="http://schemas.microsoft.com/office/drawing/2014/main" id="{18A90232-771D-0B88-2A3A-FC9CD3A46291}"/>
-              </a:ext>
-            </a:extLst>
-          </p:cNvPr>
-          <p:cNvSpPr>
-            <a:spLocks noGrp="1"/>
-          </p:cNvSpPr>
-          <p:nvPr>
-            <p:ph type="sldNum" sz="quarter" idx="12"/>
-          </p:nvPr>
-        </p:nvSpPr>
-        <p:spPr/>
-        <p:txBody>
-          <a:bodyPr/>
-          <a:lstStyle/>
-          <a:p>
-            <a:fld id="{946DE687-3AD7-5741-8041-7F1F69773D46}" type="slidenum">
-              <a:rPr lang="en-US" smtClean="0"/>
-              <a:t>‹#›</a:t>
-            </a:fld>
-            <a:endParaRPr lang="en-US"/>
-          </a:p>
-        </p:txBody>
-      </p:sp>
     </p:spTree>
     <p:extLst>
       <p:ext uri="{BB962C8B-B14F-4D97-AF65-F5344CB8AC3E}">
@@ -3677,7 +3672,7 @@
           <a:p>
             <a:fld id="{CCF15043-91C0-B948-9306-70C64EA31C4A}" type="datetimeFigureOut">
               <a:rPr lang="en-US" smtClean="0"/>
-              <a:t>7/13/25</a:t>
+              <a:t>7/16/25</a:t>
             </a:fld>
             <a:endParaRPr lang="en-US"/>
           </a:p>
@@ -3818,7 +3813,7 @@
           <a:p>
             <a:fld id="{CCF15043-91C0-B948-9306-70C64EA31C4A}" type="datetimeFigureOut">
               <a:rPr lang="en-US" smtClean="0"/>
-              <a:t>7/13/25</a:t>
+              <a:t>7/16/25</a:t>
             </a:fld>
             <a:endParaRPr lang="en-US"/>
           </a:p>
@@ -3945,7 +3940,7 @@
           <a:lstStyle/>
           <a:p>
             <a:r>
-              <a:rPr lang="en-US"/>
+              <a:rPr lang="en-US" dirty="0"/>
               <a:t>Click to edit Master title style</a:t>
             </a:r>
           </a:p>
@@ -4053,13 +4048,17 @@
                     <a:tint val="82000"/>
                   </a:schemeClr>
                 </a:solidFill>
+                <a:latin typeface="Red Hat Display Medium" panose="02010303040201060303" pitchFamily="2" charset="0"/>
+                <a:ea typeface="Red Hat Display Medium" panose="02010303040201060303" pitchFamily="2" charset="0"/>
+                <a:cs typeface="Red Hat Display Medium" panose="02010303040201060303" pitchFamily="2" charset="0"/>
               </a:defRPr>
             </a:lvl1pPr>
           </a:lstStyle>
           <a:p>
             <a:fld id="{CCF15043-91C0-B948-9306-70C64EA31C4A}" type="datetimeFigureOut">
               <a:rPr lang="en-US" smtClean="0"/>
-              <a:t>7/13/25</a:t>
+              <a:pPr/>
+              <a:t>7/16/25</a:t>
             </a:fld>
             <a:endParaRPr lang="en-US"/>
           </a:p>
@@ -4100,6 +4099,9 @@
                     <a:tint val="82000"/>
                   </a:schemeClr>
                 </a:solidFill>
+                <a:latin typeface="Red Hat Display Medium" panose="02010303040201060303" pitchFamily="2" charset="0"/>
+                <a:ea typeface="Red Hat Display Medium" panose="02010303040201060303" pitchFamily="2" charset="0"/>
+                <a:cs typeface="Red Hat Display Medium" panose="02010303040201060303" pitchFamily="2" charset="0"/>
               </a:defRPr>
             </a:lvl1pPr>
           </a:lstStyle>
@@ -4143,12 +4145,16 @@
                     <a:tint val="82000"/>
                   </a:schemeClr>
                 </a:solidFill>
+                <a:latin typeface="Red Hat Display Medium" panose="02010303040201060303" pitchFamily="2" charset="0"/>
+                <a:ea typeface="Red Hat Display Medium" panose="02010303040201060303" pitchFamily="2" charset="0"/>
+                <a:cs typeface="Red Hat Display Medium" panose="02010303040201060303" pitchFamily="2" charset="0"/>
               </a:defRPr>
             </a:lvl1pPr>
           </a:lstStyle>
           <a:p>
             <a:fld id="{946DE687-3AD7-5741-8041-7F1F69773D46}" type="slidenum">
               <a:rPr lang="en-US" smtClean="0"/>
+              <a:pPr/>
               <a:t>‹#›</a:t>
             </a:fld>
             <a:endParaRPr lang="en-US"/>
@@ -4177,7 +4183,7 @@
     <p:sldLayoutId id="2147483658" r:id="rId11"/>
     <p:sldLayoutId id="2147483666" r:id="rId12"/>
     <p:sldLayoutId id="2147483667" r:id="rId13"/>
-    <p:sldLayoutId id="2147483665" r:id="rId14"/>
+    <p:sldLayoutId id="2147483669" r:id="rId14"/>
     <p:sldLayoutId id="2147483664" r:id="rId15"/>
   </p:sldLayoutIdLst>
   <p:txStyles>
@@ -4194,9 +4200,9 @@
           <a:solidFill>
             <a:schemeClr val="tx1"/>
           </a:solidFill>
-          <a:latin typeface="+mj-lt"/>
-          <a:ea typeface="+mj-ea"/>
-          <a:cs typeface="+mj-cs"/>
+          <a:latin typeface="Red Hat Display Medium" panose="02010303040201060303" pitchFamily="2" charset="0"/>
+          <a:ea typeface="Red Hat Display Medium" panose="02010303040201060303" pitchFamily="2" charset="0"/>
+          <a:cs typeface="Red Hat Display Medium" panose="02010303040201060303" pitchFamily="2" charset="0"/>
         </a:defRPr>
       </a:lvl1pPr>
     </p:titleStyle>
@@ -4214,9 +4220,9 @@
           <a:solidFill>
             <a:schemeClr val="tx1"/>
           </a:solidFill>
-          <a:latin typeface="+mn-lt"/>
-          <a:ea typeface="+mn-ea"/>
-          <a:cs typeface="+mn-cs"/>
+          <a:latin typeface="Red Hat Display Medium" panose="02010303040201060303" pitchFamily="2" charset="0"/>
+          <a:ea typeface="Red Hat Display Medium" panose="02010303040201060303" pitchFamily="2" charset="0"/>
+          <a:cs typeface="Red Hat Display Medium" panose="02010303040201060303" pitchFamily="2" charset="0"/>
         </a:defRPr>
       </a:lvl1pPr>
       <a:lvl2pPr marL="685800" indent="-228600" algn="l" defTabSz="914400" rtl="0" eaLnBrk="1" latinLnBrk="0" hangingPunct="1">
@@ -4232,9 +4238,9 @@
           <a:solidFill>
             <a:schemeClr val="tx1"/>
           </a:solidFill>
-          <a:latin typeface="+mn-lt"/>
-          <a:ea typeface="+mn-ea"/>
-          <a:cs typeface="+mn-cs"/>
+          <a:latin typeface="Red Hat Display Medium" panose="02010303040201060303" pitchFamily="2" charset="0"/>
+          <a:ea typeface="Red Hat Display Medium" panose="02010303040201060303" pitchFamily="2" charset="0"/>
+          <a:cs typeface="Red Hat Display Medium" panose="02010303040201060303" pitchFamily="2" charset="0"/>
         </a:defRPr>
       </a:lvl2pPr>
       <a:lvl3pPr marL="1143000" indent="-228600" algn="l" defTabSz="914400" rtl="0" eaLnBrk="1" latinLnBrk="0" hangingPunct="1">
@@ -4250,9 +4256,9 @@
           <a:solidFill>
             <a:schemeClr val="tx1"/>
           </a:solidFill>
-          <a:latin typeface="+mn-lt"/>
-          <a:ea typeface="+mn-ea"/>
-          <a:cs typeface="+mn-cs"/>
+          <a:latin typeface="Red Hat Display Medium" panose="02010303040201060303" pitchFamily="2" charset="0"/>
+          <a:ea typeface="Red Hat Display Medium" panose="02010303040201060303" pitchFamily="2" charset="0"/>
+          <a:cs typeface="Red Hat Display Medium" panose="02010303040201060303" pitchFamily="2" charset="0"/>
         </a:defRPr>
       </a:lvl3pPr>
       <a:lvl4pPr marL="1600200" indent="-228600" algn="l" defTabSz="914400" rtl="0" eaLnBrk="1" latinLnBrk="0" hangingPunct="1">
@@ -4268,9 +4274,9 @@
           <a:solidFill>
             <a:schemeClr val="tx1"/>
           </a:solidFill>
-          <a:latin typeface="+mn-lt"/>
-          <a:ea typeface="+mn-ea"/>
-          <a:cs typeface="+mn-cs"/>
+          <a:latin typeface="Red Hat Display Medium" panose="02010303040201060303" pitchFamily="2" charset="0"/>
+          <a:ea typeface="Red Hat Display Medium" panose="02010303040201060303" pitchFamily="2" charset="0"/>
+          <a:cs typeface="Red Hat Display Medium" panose="02010303040201060303" pitchFamily="2" charset="0"/>
         </a:defRPr>
       </a:lvl4pPr>
       <a:lvl5pPr marL="2057400" indent="-228600" algn="l" defTabSz="914400" rtl="0" eaLnBrk="1" latinLnBrk="0" hangingPunct="1">
@@ -4286,9 +4292,9 @@
           <a:solidFill>
             <a:schemeClr val="tx1"/>
           </a:solidFill>
-          <a:latin typeface="+mn-lt"/>
-          <a:ea typeface="+mn-ea"/>
-          <a:cs typeface="+mn-cs"/>
+          <a:latin typeface="Red Hat Display Medium" panose="02010303040201060303" pitchFamily="2" charset="0"/>
+          <a:ea typeface="Red Hat Display Medium" panose="02010303040201060303" pitchFamily="2" charset="0"/>
+          <a:cs typeface="Red Hat Display Medium" panose="02010303040201060303" pitchFamily="2" charset="0"/>
         </a:defRPr>
       </a:lvl5pPr>
       <a:lvl6pPr marL="2514600" indent="-228600" algn="l" defTabSz="914400" rtl="0" eaLnBrk="1" latinLnBrk="0" hangingPunct="1">

</xml_diff>